<commit_message>
Updated presentation and scripts
</commit_message>
<xml_diff>
--- a/Presentations/SQL Server R Services/SQL Server R Services - ABQSQL.pptx
+++ b/Presentations/SQL Server R Services/SQL Server R Services - ABQSQL.pptx
@@ -6,31 +6,35 @@
     <p:sldMasterId id="2147483799" r:id="rId2"/>
   </p:sldMasterIdLst>
   <p:notesMasterIdLst>
-    <p:notesMasterId r:id="rId22"/>
+    <p:notesMasterId r:id="rId26"/>
   </p:notesMasterIdLst>
   <p:handoutMasterIdLst>
-    <p:handoutMasterId r:id="rId23"/>
+    <p:handoutMasterId r:id="rId27"/>
   </p:handoutMasterIdLst>
   <p:sldIdLst>
     <p:sldId id="287" r:id="rId3"/>
     <p:sldId id="288" r:id="rId4"/>
     <p:sldId id="351" r:id="rId5"/>
-    <p:sldId id="387" r:id="rId6"/>
-    <p:sldId id="388" r:id="rId7"/>
-    <p:sldId id="348" r:id="rId8"/>
-    <p:sldId id="378" r:id="rId9"/>
-    <p:sldId id="379" r:id="rId10"/>
-    <p:sldId id="380" r:id="rId11"/>
-    <p:sldId id="377" r:id="rId12"/>
-    <p:sldId id="381" r:id="rId13"/>
-    <p:sldId id="382" r:id="rId14"/>
-    <p:sldId id="383" r:id="rId15"/>
-    <p:sldId id="384" r:id="rId16"/>
-    <p:sldId id="385" r:id="rId17"/>
-    <p:sldId id="364" r:id="rId18"/>
-    <p:sldId id="386" r:id="rId19"/>
-    <p:sldId id="365" r:id="rId20"/>
-    <p:sldId id="389" r:id="rId21"/>
+    <p:sldId id="391" r:id="rId6"/>
+    <p:sldId id="392" r:id="rId7"/>
+    <p:sldId id="393" r:id="rId8"/>
+    <p:sldId id="390" r:id="rId9"/>
+    <p:sldId id="387" r:id="rId10"/>
+    <p:sldId id="388" r:id="rId11"/>
+    <p:sldId id="348" r:id="rId12"/>
+    <p:sldId id="378" r:id="rId13"/>
+    <p:sldId id="379" r:id="rId14"/>
+    <p:sldId id="380" r:id="rId15"/>
+    <p:sldId id="377" r:id="rId16"/>
+    <p:sldId id="381" r:id="rId17"/>
+    <p:sldId id="382" r:id="rId18"/>
+    <p:sldId id="383" r:id="rId19"/>
+    <p:sldId id="384" r:id="rId20"/>
+    <p:sldId id="385" r:id="rId21"/>
+    <p:sldId id="364" r:id="rId22"/>
+    <p:sldId id="386" r:id="rId23"/>
+    <p:sldId id="365" r:id="rId24"/>
+    <p:sldId id="389" r:id="rId25"/>
   </p:sldIdLst>
   <p:sldSz cx="9144000" cy="6858000" type="screen4x3"/>
   <p:notesSz cx="6858000" cy="9144000"/>
@@ -287,7 +291,7 @@
               <a:pPr>
                 <a:defRPr/>
               </a:pPr>
-              <a:t>1/8/2016</a:t>
+              <a:t>1/21/2016</a:t>
             </a:fld>
             <a:endParaRPr lang="en-US" dirty="0"/>
           </a:p>
@@ -507,7 +511,7 @@
               <a:pPr>
                 <a:defRPr/>
               </a:pPr>
-              <a:t>1/8/2016</a:t>
+              <a:t>1/21/2016</a:t>
             </a:fld>
             <a:endParaRPr lang="en-US" dirty="0"/>
           </a:p>
@@ -7109,7 +7113,23 @@
                   <a:srgbClr val="FF0000"/>
                 </a:solidFill>
               </a:rPr>
-              <a:t>ABQSQL, January 8, 2016</a:t>
+              <a:t>ABQSQL, January </a:t>
+            </a:r>
+            <a:r>
+              <a:rPr lang="en-US" dirty="0" smtClean="0">
+                <a:solidFill>
+                  <a:srgbClr val="FF0000"/>
+                </a:solidFill>
+              </a:rPr>
+              <a:t>22, </a:t>
+            </a:r>
+            <a:r>
+              <a:rPr lang="en-US" dirty="0" smtClean="0">
+                <a:solidFill>
+                  <a:srgbClr val="FF0000"/>
+                </a:solidFill>
+              </a:rPr>
+              <a:t>2016</a:t>
             </a:r>
           </a:p>
         </p:txBody>
@@ -7197,7 +7217,7 @@
                 <a:latin typeface="Arial" pitchFamily="34" charset="0"/>
                 <a:cs typeface="Arial" pitchFamily="34" charset="0"/>
               </a:rPr>
-              <a:t>Installing SQL Server R Services, part 5</a:t>
+              <a:t>Installing SQL Server R Services, part 1</a:t>
             </a:r>
             <a:endParaRPr lang="en-US" dirty="0">
               <a:latin typeface="Arial" pitchFamily="34" charset="0"/>
@@ -7233,82 +7253,18 @@
               <a:buNone/>
             </a:pPr>
             <a:r>
+              <a:rPr lang="en-US" dirty="0">
+                <a:latin typeface="Arial" pitchFamily="34" charset="0"/>
+                <a:cs typeface="Arial" pitchFamily="34" charset="0"/>
+              </a:rPr>
+              <a:t>1</a:t>
+            </a:r>
+            <a:r>
               <a:rPr lang="en-US" dirty="0" smtClean="0">
                 <a:latin typeface="Arial" pitchFamily="34" charset="0"/>
                 <a:cs typeface="Arial" pitchFamily="34" charset="0"/>
               </a:rPr>
-              <a:t>2.  Install </a:t>
-            </a:r>
-            <a:r>
-              <a:rPr lang="en-US" dirty="0">
-                <a:latin typeface="Arial" pitchFamily="34" charset="0"/>
-                <a:cs typeface="Arial" pitchFamily="34" charset="0"/>
-              </a:rPr>
-              <a:t>Revolution R Open </a:t>
-            </a:r>
-            <a:r>
-              <a:rPr lang="en-US" dirty="0" smtClean="0">
-                <a:latin typeface="Arial" pitchFamily="34" charset="0"/>
-                <a:cs typeface="Arial" pitchFamily="34" charset="0"/>
-              </a:rPr>
-              <a:t>3.2.2 on database server</a:t>
-            </a:r>
-          </a:p>
-          <a:p>
-            <a:pPr marL="0" indent="0">
-              <a:spcBef>
-                <a:spcPts val="0"/>
-              </a:spcBef>
-              <a:buNone/>
-            </a:pPr>
-            <a:r>
-              <a:rPr lang="en-US" dirty="0" smtClean="0">
-                <a:latin typeface="Arial" pitchFamily="34" charset="0"/>
-                <a:cs typeface="Arial" pitchFamily="34" charset="0"/>
-              </a:rPr>
-              <a:t>	(R runtime engine)</a:t>
-            </a:r>
-          </a:p>
-          <a:p>
-            <a:pPr marL="0" indent="0">
-              <a:spcBef>
-                <a:spcPts val="0"/>
-              </a:spcBef>
-              <a:buNone/>
-            </a:pPr>
-            <a:endParaRPr lang="en-US" dirty="0" smtClean="0">
-              <a:latin typeface="Arial" pitchFamily="34" charset="0"/>
-              <a:cs typeface="Arial" pitchFamily="34" charset="0"/>
-            </a:endParaRPr>
-          </a:p>
-          <a:p>
-            <a:pPr marL="0" indent="0">
-              <a:spcBef>
-                <a:spcPts val="0"/>
-              </a:spcBef>
-              <a:buNone/>
-            </a:pPr>
-            <a:r>
-              <a:rPr lang="en-US" dirty="0" smtClean="0">
-                <a:latin typeface="Arial" pitchFamily="34" charset="0"/>
-                <a:cs typeface="Arial" pitchFamily="34" charset="0"/>
-              </a:rPr>
-              <a:t>3.  Install Revolution R Enterprise 7.5 on database server</a:t>
-            </a:r>
-          </a:p>
-          <a:p>
-            <a:pPr marL="0" indent="0">
-              <a:spcBef>
-                <a:spcPts val="0"/>
-              </a:spcBef>
-              <a:buNone/>
-            </a:pPr>
-            <a:r>
-              <a:rPr lang="en-US" dirty="0" smtClean="0">
-                <a:latin typeface="Arial" pitchFamily="34" charset="0"/>
-                <a:cs typeface="Arial" pitchFamily="34" charset="0"/>
-              </a:rPr>
-              <a:t>	(R platform)</a:t>
+              <a:t>.  Install Advanced Analytics Extensions</a:t>
             </a:r>
           </a:p>
           <a:p>
@@ -7352,7 +7308,7 @@
                 <a:cs typeface="Arial" pitchFamily="34" charset="0"/>
                 <a:hlinkClick r:id="rId2"/>
               </a:rPr>
-              <a:t>msdn.microsoft.com/en-US/library/mt590809.aspx</a:t>
+              <a:t>msdn.microsoft.com/en-US/library/mt590808.aspx</a:t>
             </a:r>
             <a:endParaRPr lang="en-US" dirty="0">
               <a:latin typeface="Arial" pitchFamily="34" charset="0"/>
@@ -7376,7 +7332,7 @@
     </p:spTree>
     <p:extLst>
       <p:ext uri="{BB962C8B-B14F-4D97-AF65-F5344CB8AC3E}">
-        <p14:creationId xmlns:p14="http://schemas.microsoft.com/office/powerpoint/2010/main" val="1006024625"/>
+        <p14:creationId xmlns:p14="http://schemas.microsoft.com/office/powerpoint/2010/main" val="1660605471"/>
       </p:ext>
     </p:extLst>
   </p:cSld>
@@ -7435,15 +7391,12 @@
                 <a:latin typeface="Arial" pitchFamily="34" charset="0"/>
                 <a:cs typeface="Arial" pitchFamily="34" charset="0"/>
               </a:rPr>
-              <a:t>Installing SQL Server R Services, part </a:t>
-            </a:r>
-            <a:r>
-              <a:rPr lang="en-US" dirty="0">
-                <a:latin typeface="Arial" pitchFamily="34" charset="0"/>
-                <a:cs typeface="Arial" pitchFamily="34" charset="0"/>
-              </a:rPr>
-              <a:t>6</a:t>
-            </a:r>
+              <a:t>Installing SQL Server R Services, part 2</a:t>
+            </a:r>
+            <a:endParaRPr lang="en-US" dirty="0">
+              <a:latin typeface="Arial" pitchFamily="34" charset="0"/>
+              <a:cs typeface="Arial" pitchFamily="34" charset="0"/>
+            </a:endParaRPr>
           </a:p>
         </p:txBody>
       </p:sp>
@@ -7469,8 +7422,8 @@
         </p:blipFill>
         <p:spPr>
           <a:xfrm>
-            <a:off x="227867" y="1309515"/>
-            <a:ext cx="6076293" cy="4219087"/>
+            <a:off x="253218" y="1336431"/>
+            <a:ext cx="6935373" cy="4174947"/>
           </a:xfrm>
           <a:prstGeom prst="rect">
             <a:avLst/>
@@ -7480,7 +7433,7 @@
     </p:spTree>
     <p:extLst>
       <p:ext uri="{BB962C8B-B14F-4D97-AF65-F5344CB8AC3E}">
-        <p14:creationId xmlns:p14="http://schemas.microsoft.com/office/powerpoint/2010/main" val="1622342288"/>
+        <p14:creationId xmlns:p14="http://schemas.microsoft.com/office/powerpoint/2010/main" val="240537631"/>
       </p:ext>
     </p:extLst>
   </p:cSld>
@@ -7539,12 +7492,15 @@
                 <a:latin typeface="Arial" pitchFamily="34" charset="0"/>
                 <a:cs typeface="Arial" pitchFamily="34" charset="0"/>
               </a:rPr>
-              <a:t>Installing SQL Server R Services, part 7</a:t>
-            </a:r>
-            <a:endParaRPr lang="en-US" dirty="0">
-              <a:latin typeface="Arial" pitchFamily="34" charset="0"/>
-              <a:cs typeface="Arial" pitchFamily="34" charset="0"/>
-            </a:endParaRPr>
+              <a:t>Installing SQL Server R Services, part </a:t>
+            </a:r>
+            <a:r>
+              <a:rPr lang="en-US" dirty="0">
+                <a:latin typeface="Arial" pitchFamily="34" charset="0"/>
+                <a:cs typeface="Arial" pitchFamily="34" charset="0"/>
+              </a:rPr>
+              <a:t>3</a:t>
+            </a:r>
           </a:p>
         </p:txBody>
       </p:sp>
@@ -7570,8 +7526,8 @@
         </p:blipFill>
         <p:spPr>
           <a:xfrm>
-            <a:off x="248749" y="1345882"/>
-            <a:ext cx="5322057" cy="4171907"/>
+            <a:off x="243179" y="1323584"/>
+            <a:ext cx="5098631" cy="4134681"/>
           </a:xfrm>
           <a:prstGeom prst="rect">
             <a:avLst/>
@@ -7581,7 +7537,7 @@
     </p:spTree>
     <p:extLst>
       <p:ext uri="{BB962C8B-B14F-4D97-AF65-F5344CB8AC3E}">
-        <p14:creationId xmlns:p14="http://schemas.microsoft.com/office/powerpoint/2010/main" val="3434753538"/>
+        <p14:creationId xmlns:p14="http://schemas.microsoft.com/office/powerpoint/2010/main" val="3687509454"/>
       </p:ext>
     </p:extLst>
   </p:cSld>
@@ -7640,7 +7596,7 @@
                 <a:latin typeface="Arial" pitchFamily="34" charset="0"/>
                 <a:cs typeface="Arial" pitchFamily="34" charset="0"/>
               </a:rPr>
-              <a:t>Installing SQL Server R Services, part 8</a:t>
+              <a:t>Installing SQL Server R Services, part 4</a:t>
             </a:r>
             <a:endParaRPr lang="en-US" dirty="0">
               <a:latin typeface="Arial" pitchFamily="34" charset="0"/>
@@ -7649,235 +7605,40 @@
           </a:p>
         </p:txBody>
       </p:sp>
-      <p:sp>
-        <p:nvSpPr>
-          <p:cNvPr id="3" name="Content Placeholder 2"/>
-          <p:cNvSpPr>
-            <a:spLocks noGrp="1"/>
-          </p:cNvSpPr>
-          <p:nvPr>
-            <p:ph idx="1"/>
-          </p:nvPr>
-        </p:nvSpPr>
+      <p:pic>
+        <p:nvPicPr>
+          <p:cNvPr id="4" name="Picture 3"/>
+          <p:cNvPicPr>
+            <a:picLocks noChangeAspect="1"/>
+          </p:cNvPicPr>
+          <p:nvPr/>
+        </p:nvPicPr>
+        <p:blipFill>
+          <a:blip r:embed="rId2">
+            <a:extLst>
+              <a:ext uri="{28A0092B-C50C-407E-A947-70E740481C1C}">
+                <a14:useLocalDpi xmlns:a14="http://schemas.microsoft.com/office/drawing/2010/main" val="0"/>
+              </a:ext>
+            </a:extLst>
+          </a:blip>
+          <a:stretch>
+            <a:fillRect/>
+          </a:stretch>
+        </p:blipFill>
         <p:spPr>
           <a:xfrm>
-            <a:off x="390418" y="1356189"/>
-            <a:ext cx="8640870" cy="4397339"/>
+            <a:off x="211016" y="1364383"/>
+            <a:ext cx="6527410" cy="4152699"/>
           </a:xfrm>
-        </p:spPr>
-        <p:txBody>
-          <a:bodyPr/>
-          <a:lstStyle/>
-          <a:p>
-            <a:pPr marL="0" indent="0">
-              <a:spcBef>
-                <a:spcPts val="0"/>
-              </a:spcBef>
-              <a:buNone/>
-            </a:pPr>
-            <a:r>
-              <a:rPr lang="en-US" dirty="0" smtClean="0">
-                <a:latin typeface="Arial" pitchFamily="34" charset="0"/>
-                <a:cs typeface="Arial" pitchFamily="34" charset="0"/>
-              </a:rPr>
-              <a:t>Post-installation scripts and configuration</a:t>
-            </a:r>
-          </a:p>
-          <a:p>
-            <a:pPr marL="0" indent="0">
-              <a:spcBef>
-                <a:spcPts val="0"/>
-              </a:spcBef>
-              <a:buNone/>
-            </a:pPr>
-            <a:endParaRPr lang="en-US" dirty="0" smtClean="0">
-              <a:latin typeface="Arial" pitchFamily="34" charset="0"/>
-              <a:cs typeface="Arial" pitchFamily="34" charset="0"/>
-            </a:endParaRPr>
-          </a:p>
-          <a:p>
-            <a:pPr marL="0" indent="0">
-              <a:spcBef>
-                <a:spcPts val="0"/>
-              </a:spcBef>
-              <a:buNone/>
-            </a:pPr>
-            <a:r>
-              <a:rPr lang="en-US" dirty="0" smtClean="0">
-                <a:latin typeface="Arial" pitchFamily="34" charset="0"/>
-                <a:cs typeface="Arial" pitchFamily="34" charset="0"/>
-              </a:rPr>
-              <a:t>1.  Enable external scripts</a:t>
-            </a:r>
-            <a:endParaRPr lang="en-US" dirty="0">
-              <a:latin typeface="Arial" pitchFamily="34" charset="0"/>
-              <a:cs typeface="Arial" pitchFamily="34" charset="0"/>
-            </a:endParaRPr>
-          </a:p>
-          <a:p>
-            <a:pPr marL="0" indent="0">
-              <a:spcBef>
-                <a:spcPts val="0"/>
-              </a:spcBef>
-              <a:buNone/>
-            </a:pPr>
-            <a:r>
-              <a:rPr lang="en-US" sz="2000" dirty="0" smtClean="0">
-                <a:latin typeface="Courier New" panose="02070309020205020404" pitchFamily="49" charset="0"/>
-                <a:cs typeface="Courier New" panose="02070309020205020404" pitchFamily="49" charset="0"/>
-              </a:rPr>
-              <a:t>EXEC </a:t>
-            </a:r>
-            <a:r>
-              <a:rPr lang="en-US" sz="2000" dirty="0" err="1">
-                <a:latin typeface="Courier New" panose="02070309020205020404" pitchFamily="49" charset="0"/>
-                <a:cs typeface="Courier New" panose="02070309020205020404" pitchFamily="49" charset="0"/>
-              </a:rPr>
-              <a:t>sp_configure</a:t>
-            </a:r>
-            <a:r>
-              <a:rPr lang="en-US" sz="2000" dirty="0">
-                <a:latin typeface="Courier New" panose="02070309020205020404" pitchFamily="49" charset="0"/>
-                <a:cs typeface="Courier New" panose="02070309020205020404" pitchFamily="49" charset="0"/>
-              </a:rPr>
-              <a:t> 'external scripts enabled', 1; </a:t>
-            </a:r>
-          </a:p>
-          <a:p>
-            <a:pPr marL="0" indent="0">
-              <a:spcBef>
-                <a:spcPts val="0"/>
-              </a:spcBef>
-              <a:buNone/>
-            </a:pPr>
-            <a:r>
-              <a:rPr lang="en-US" sz="2000" dirty="0" smtClean="0">
-                <a:latin typeface="Courier New" panose="02070309020205020404" pitchFamily="49" charset="0"/>
-                <a:cs typeface="Courier New" panose="02070309020205020404" pitchFamily="49" charset="0"/>
-              </a:rPr>
-              <a:t>RECONFIGURE;</a:t>
-            </a:r>
-          </a:p>
-          <a:p>
-            <a:pPr marL="0" indent="0">
-              <a:spcBef>
-                <a:spcPts val="0"/>
-              </a:spcBef>
-              <a:buNone/>
-            </a:pPr>
-            <a:endParaRPr lang="en-US" dirty="0" smtClean="0">
-              <a:latin typeface="Arial" pitchFamily="34" charset="0"/>
-              <a:cs typeface="Arial" pitchFamily="34" charset="0"/>
-            </a:endParaRPr>
-          </a:p>
-          <a:p>
-            <a:pPr marL="0" indent="0">
-              <a:spcBef>
-                <a:spcPts val="0"/>
-              </a:spcBef>
-              <a:buNone/>
-            </a:pPr>
-            <a:r>
-              <a:rPr lang="en-US" dirty="0" smtClean="0">
-                <a:latin typeface="Arial" pitchFamily="34" charset="0"/>
-                <a:cs typeface="Arial" pitchFamily="34" charset="0"/>
-              </a:rPr>
-              <a:t>2.  Configure memory appropriately</a:t>
-            </a:r>
-          </a:p>
-          <a:p>
-            <a:pPr marL="0" indent="0">
-              <a:spcBef>
-                <a:spcPts val="0"/>
-              </a:spcBef>
-              <a:buNone/>
-            </a:pPr>
-            <a:endParaRPr lang="en-US" dirty="0" smtClean="0">
-              <a:latin typeface="Arial" pitchFamily="34" charset="0"/>
-              <a:cs typeface="Arial" pitchFamily="34" charset="0"/>
-            </a:endParaRPr>
-          </a:p>
-          <a:p>
-            <a:pPr marL="0" indent="0">
-              <a:spcBef>
-                <a:spcPts val="0"/>
-              </a:spcBef>
-              <a:buNone/>
-            </a:pPr>
-            <a:r>
-              <a:rPr lang="en-US" dirty="0" smtClean="0">
-                <a:latin typeface="Arial" pitchFamily="34" charset="0"/>
-                <a:cs typeface="Arial" pitchFamily="34" charset="0"/>
-              </a:rPr>
-              <a:t>3.  Post-installation command script</a:t>
-            </a:r>
-          </a:p>
-          <a:p>
-            <a:pPr marL="0" indent="0">
-              <a:spcBef>
-                <a:spcPts val="0"/>
-              </a:spcBef>
-              <a:buNone/>
-            </a:pPr>
-            <a:endParaRPr lang="en-US" dirty="0">
-              <a:latin typeface="Arial" pitchFamily="34" charset="0"/>
-              <a:cs typeface="Arial" pitchFamily="34" charset="0"/>
-            </a:endParaRPr>
-          </a:p>
-          <a:p>
-            <a:pPr marL="0" indent="0">
-              <a:spcBef>
-                <a:spcPts val="0"/>
-              </a:spcBef>
-              <a:buNone/>
-            </a:pPr>
-            <a:r>
-              <a:rPr lang="en-US" dirty="0" smtClean="0">
-                <a:latin typeface="Arial" pitchFamily="34" charset="0"/>
-                <a:cs typeface="Arial" pitchFamily="34" charset="0"/>
-                <a:hlinkClick r:id="rId2"/>
-              </a:rPr>
-              <a:t>https</a:t>
-            </a:r>
-            <a:r>
-              <a:rPr lang="en-US" dirty="0">
-                <a:latin typeface="Arial" pitchFamily="34" charset="0"/>
-                <a:cs typeface="Arial" pitchFamily="34" charset="0"/>
-                <a:hlinkClick r:id="rId2"/>
-              </a:rPr>
-              <a:t>://</a:t>
-            </a:r>
-            <a:r>
-              <a:rPr lang="en-US" dirty="0" smtClean="0">
-                <a:latin typeface="Arial" pitchFamily="34" charset="0"/>
-                <a:cs typeface="Arial" pitchFamily="34" charset="0"/>
-                <a:hlinkClick r:id="rId2"/>
-              </a:rPr>
-              <a:t>msdn.microsoft.com/en-US/library/mt590536.aspx</a:t>
-            </a:r>
-            <a:endParaRPr lang="en-US" dirty="0">
-              <a:latin typeface="Arial" pitchFamily="34" charset="0"/>
-              <a:cs typeface="Arial" pitchFamily="34" charset="0"/>
-            </a:endParaRPr>
-          </a:p>
-          <a:p>
-            <a:pPr marL="0" indent="0">
-              <a:spcBef>
-                <a:spcPts val="0"/>
-              </a:spcBef>
-              <a:buNone/>
-            </a:pPr>
-            <a:endParaRPr lang="en-US" dirty="0" smtClean="0">
-              <a:latin typeface="Arial" pitchFamily="34" charset="0"/>
-              <a:cs typeface="Arial" pitchFamily="34" charset="0"/>
-            </a:endParaRPr>
-          </a:p>
-        </p:txBody>
-      </p:sp>
+          <a:prstGeom prst="rect">
+            <a:avLst/>
+          </a:prstGeom>
+        </p:spPr>
+      </p:pic>
     </p:spTree>
     <p:extLst>
       <p:ext uri="{BB962C8B-B14F-4D97-AF65-F5344CB8AC3E}">
-        <p14:creationId xmlns:p14="http://schemas.microsoft.com/office/powerpoint/2010/main" val="2880793802"/>
+        <p14:creationId xmlns:p14="http://schemas.microsoft.com/office/powerpoint/2010/main" val="2571625966"/>
       </p:ext>
     </p:extLst>
   </p:cSld>
@@ -7936,52 +7697,186 @@
                 <a:latin typeface="Arial" pitchFamily="34" charset="0"/>
                 <a:cs typeface="Arial" pitchFamily="34" charset="0"/>
               </a:rPr>
-              <a:t>Installing SQL Server R Services, part </a:t>
+              <a:t>Installing SQL Server R Services, part 5</a:t>
+            </a:r>
+            <a:endParaRPr lang="en-US" dirty="0">
+              <a:latin typeface="Arial" pitchFamily="34" charset="0"/>
+              <a:cs typeface="Arial" pitchFamily="34" charset="0"/>
+            </a:endParaRPr>
+          </a:p>
+        </p:txBody>
+      </p:sp>
+      <p:sp>
+        <p:nvSpPr>
+          <p:cNvPr id="3" name="Content Placeholder 2"/>
+          <p:cNvSpPr>
+            <a:spLocks noGrp="1"/>
+          </p:cNvSpPr>
+          <p:nvPr>
+            <p:ph idx="1"/>
+          </p:nvPr>
+        </p:nvSpPr>
+        <p:spPr>
+          <a:xfrm>
+            <a:off x="390418" y="1356189"/>
+            <a:ext cx="8640870" cy="4397339"/>
+          </a:xfrm>
+        </p:spPr>
+        <p:txBody>
+          <a:bodyPr/>
+          <a:lstStyle/>
+          <a:p>
+            <a:pPr marL="0" indent="0">
+              <a:spcBef>
+                <a:spcPts val="0"/>
+              </a:spcBef>
+              <a:buNone/>
+            </a:pPr>
+            <a:r>
+              <a:rPr lang="en-US" dirty="0" smtClean="0">
+                <a:latin typeface="Arial" pitchFamily="34" charset="0"/>
+                <a:cs typeface="Arial" pitchFamily="34" charset="0"/>
+              </a:rPr>
+              <a:t>2.  Install </a:t>
             </a:r>
             <a:r>
               <a:rPr lang="en-US" dirty="0">
                 <a:latin typeface="Arial" pitchFamily="34" charset="0"/>
                 <a:cs typeface="Arial" pitchFamily="34" charset="0"/>
               </a:rPr>
-              <a:t>9</a:t>
-            </a:r>
+              <a:t>Revolution R Open </a:t>
+            </a:r>
+            <a:r>
+              <a:rPr lang="en-US" dirty="0" smtClean="0">
+                <a:latin typeface="Arial" pitchFamily="34" charset="0"/>
+                <a:cs typeface="Arial" pitchFamily="34" charset="0"/>
+              </a:rPr>
+              <a:t>3.2.2 on database server</a:t>
+            </a:r>
+          </a:p>
+          <a:p>
+            <a:pPr marL="0" indent="0">
+              <a:spcBef>
+                <a:spcPts val="0"/>
+              </a:spcBef>
+              <a:buNone/>
+            </a:pPr>
+            <a:r>
+              <a:rPr lang="en-US" dirty="0" smtClean="0">
+                <a:latin typeface="Arial" pitchFamily="34" charset="0"/>
+                <a:cs typeface="Arial" pitchFamily="34" charset="0"/>
+              </a:rPr>
+              <a:t>	(R runtime engine)</a:t>
+            </a:r>
+          </a:p>
+          <a:p>
+            <a:pPr marL="0" indent="0">
+              <a:spcBef>
+                <a:spcPts val="0"/>
+              </a:spcBef>
+              <a:buNone/>
+            </a:pPr>
+            <a:endParaRPr lang="en-US" dirty="0" smtClean="0">
+              <a:latin typeface="Arial" pitchFamily="34" charset="0"/>
+              <a:cs typeface="Arial" pitchFamily="34" charset="0"/>
+            </a:endParaRPr>
+          </a:p>
+          <a:p>
+            <a:pPr marL="0" indent="0">
+              <a:spcBef>
+                <a:spcPts val="0"/>
+              </a:spcBef>
+              <a:buNone/>
+            </a:pPr>
+            <a:r>
+              <a:rPr lang="en-US" dirty="0" smtClean="0">
+                <a:latin typeface="Arial" pitchFamily="34" charset="0"/>
+                <a:cs typeface="Arial" pitchFamily="34" charset="0"/>
+              </a:rPr>
+              <a:t>3.  Install Revolution R Enterprise 7.5 on database server</a:t>
+            </a:r>
+          </a:p>
+          <a:p>
+            <a:pPr marL="0" indent="0">
+              <a:spcBef>
+                <a:spcPts val="0"/>
+              </a:spcBef>
+              <a:buNone/>
+            </a:pPr>
+            <a:r>
+              <a:rPr lang="en-US" dirty="0" smtClean="0">
+                <a:latin typeface="Arial" pitchFamily="34" charset="0"/>
+                <a:cs typeface="Arial" pitchFamily="34" charset="0"/>
+              </a:rPr>
+              <a:t>	(R platform)</a:t>
+            </a:r>
+          </a:p>
+          <a:p>
+            <a:pPr marL="0" indent="0">
+              <a:spcBef>
+                <a:spcPts val="0"/>
+              </a:spcBef>
+              <a:buNone/>
+            </a:pPr>
+            <a:endParaRPr lang="en-US" dirty="0">
+              <a:latin typeface="Arial" pitchFamily="34" charset="0"/>
+              <a:cs typeface="Arial" pitchFamily="34" charset="0"/>
+            </a:endParaRPr>
+          </a:p>
+          <a:p>
+            <a:pPr marL="0" indent="0">
+              <a:spcBef>
+                <a:spcPts val="0"/>
+              </a:spcBef>
+              <a:buNone/>
+            </a:pPr>
+            <a:r>
+              <a:rPr lang="en-US" dirty="0" smtClean="0">
+                <a:latin typeface="Arial" pitchFamily="34" charset="0"/>
+                <a:cs typeface="Arial" pitchFamily="34" charset="0"/>
+                <a:hlinkClick r:id="rId2"/>
+              </a:rPr>
+              <a:t>https</a:t>
+            </a:r>
+            <a:r>
+              <a:rPr lang="en-US" dirty="0">
+                <a:latin typeface="Arial" pitchFamily="34" charset="0"/>
+                <a:cs typeface="Arial" pitchFamily="34" charset="0"/>
+                <a:hlinkClick r:id="rId2"/>
+              </a:rPr>
+              <a:t>://</a:t>
+            </a:r>
+            <a:r>
+              <a:rPr lang="en-US" dirty="0" smtClean="0">
+                <a:latin typeface="Arial" pitchFamily="34" charset="0"/>
+                <a:cs typeface="Arial" pitchFamily="34" charset="0"/>
+                <a:hlinkClick r:id="rId2"/>
+              </a:rPr>
+              <a:t>msdn.microsoft.com/en-US/library/mt590809.aspx</a:t>
+            </a:r>
+            <a:endParaRPr lang="en-US" dirty="0">
+              <a:latin typeface="Arial" pitchFamily="34" charset="0"/>
+              <a:cs typeface="Arial" pitchFamily="34" charset="0"/>
+            </a:endParaRPr>
+          </a:p>
+          <a:p>
+            <a:pPr marL="0" indent="0">
+              <a:spcBef>
+                <a:spcPts val="0"/>
+              </a:spcBef>
+              <a:buNone/>
+            </a:pPr>
+            <a:endParaRPr lang="en-US" dirty="0" smtClean="0">
+              <a:latin typeface="Arial" pitchFamily="34" charset="0"/>
+              <a:cs typeface="Arial" pitchFamily="34" charset="0"/>
+            </a:endParaRPr>
           </a:p>
         </p:txBody>
       </p:sp>
-      <p:pic>
-        <p:nvPicPr>
-          <p:cNvPr id="3" name="Picture 2"/>
-          <p:cNvPicPr>
-            <a:picLocks noChangeAspect="1"/>
-          </p:cNvPicPr>
-          <p:nvPr/>
-        </p:nvPicPr>
-        <p:blipFill>
-          <a:blip r:embed="rId2">
-            <a:extLst>
-              <a:ext uri="{28A0092B-C50C-407E-A947-70E740481C1C}">
-                <a14:useLocalDpi xmlns:a14="http://schemas.microsoft.com/office/drawing/2010/main" val="0"/>
-              </a:ext>
-            </a:extLst>
-          </a:blip>
-          <a:stretch>
-            <a:fillRect/>
-          </a:stretch>
-        </p:blipFill>
-        <p:spPr>
-          <a:xfrm>
-            <a:off x="316303" y="1383982"/>
-            <a:ext cx="4980805" cy="4032080"/>
-          </a:xfrm>
-          <a:prstGeom prst="rect">
-            <a:avLst/>
-          </a:prstGeom>
-        </p:spPr>
-      </p:pic>
     </p:spTree>
     <p:extLst>
       <p:ext uri="{BB962C8B-B14F-4D97-AF65-F5344CB8AC3E}">
-        <p14:creationId xmlns:p14="http://schemas.microsoft.com/office/powerpoint/2010/main" val="585259203"/>
+        <p14:creationId xmlns:p14="http://schemas.microsoft.com/office/powerpoint/2010/main" val="1006024625"/>
       </p:ext>
     </p:extLst>
   </p:cSld>
@@ -8040,18 +7935,21 @@
                 <a:latin typeface="Arial" pitchFamily="34" charset="0"/>
                 <a:cs typeface="Arial" pitchFamily="34" charset="0"/>
               </a:rPr>
-              <a:t>Installing SQL Server R Services, part 10</a:t>
-            </a:r>
-            <a:endParaRPr lang="en-US" dirty="0">
-              <a:latin typeface="Arial" pitchFamily="34" charset="0"/>
-              <a:cs typeface="Arial" pitchFamily="34" charset="0"/>
-            </a:endParaRPr>
+              <a:t>Installing SQL Server R Services, part </a:t>
+            </a:r>
+            <a:r>
+              <a:rPr lang="en-US" dirty="0">
+                <a:latin typeface="Arial" pitchFamily="34" charset="0"/>
+                <a:cs typeface="Arial" pitchFamily="34" charset="0"/>
+              </a:rPr>
+              <a:t>6</a:t>
+            </a:r>
           </a:p>
         </p:txBody>
       </p:sp>
       <p:pic>
         <p:nvPicPr>
-          <p:cNvPr id="4" name="Picture 3"/>
+          <p:cNvPr id="5" name="Picture 4"/>
           <p:cNvPicPr>
             <a:picLocks noChangeAspect="1"/>
           </p:cNvPicPr>
@@ -8071,8 +7969,8 @@
         </p:blipFill>
         <p:spPr>
           <a:xfrm>
-            <a:off x="292710" y="1387499"/>
-            <a:ext cx="8062484" cy="4084833"/>
+            <a:off x="227867" y="1309515"/>
+            <a:ext cx="6076293" cy="4219087"/>
           </a:xfrm>
           <a:prstGeom prst="rect">
             <a:avLst/>
@@ -8082,7 +7980,7 @@
     </p:spTree>
     <p:extLst>
       <p:ext uri="{BB962C8B-B14F-4D97-AF65-F5344CB8AC3E}">
-        <p14:creationId xmlns:p14="http://schemas.microsoft.com/office/powerpoint/2010/main" val="2729895670"/>
+        <p14:creationId xmlns:p14="http://schemas.microsoft.com/office/powerpoint/2010/main" val="1622342288"/>
       </p:ext>
     </p:extLst>
   </p:cSld>
@@ -8141,7 +8039,7 @@
                 <a:latin typeface="Arial" pitchFamily="34" charset="0"/>
                 <a:cs typeface="Arial" pitchFamily="34" charset="0"/>
               </a:rPr>
-              <a:t>Getting Data Into and Out Of R</a:t>
+              <a:t>Installing SQL Server R Services, part 7</a:t>
             </a:r>
             <a:endParaRPr lang="en-US" dirty="0">
               <a:latin typeface="Arial" pitchFamily="34" charset="0"/>
@@ -8150,50 +8048,40 @@
           </a:p>
         </p:txBody>
       </p:sp>
-      <p:sp>
-        <p:nvSpPr>
-          <p:cNvPr id="3" name="Content Placeholder 2"/>
-          <p:cNvSpPr>
-            <a:spLocks noGrp="1"/>
-          </p:cNvSpPr>
-          <p:nvPr>
-            <p:ph idx="1"/>
-          </p:nvPr>
-        </p:nvSpPr>
+      <p:pic>
+        <p:nvPicPr>
+          <p:cNvPr id="3" name="Picture 2"/>
+          <p:cNvPicPr>
+            <a:picLocks noChangeAspect="1"/>
+          </p:cNvPicPr>
+          <p:nvPr/>
+        </p:nvPicPr>
+        <p:blipFill>
+          <a:blip r:embed="rId2">
+            <a:extLst>
+              <a:ext uri="{28A0092B-C50C-407E-A947-70E740481C1C}">
+                <a14:useLocalDpi xmlns:a14="http://schemas.microsoft.com/office/drawing/2010/main" val="0"/>
+              </a:ext>
+            </a:extLst>
+          </a:blip>
+          <a:stretch>
+            <a:fillRect/>
+          </a:stretch>
+        </p:blipFill>
         <p:spPr>
           <a:xfrm>
-            <a:off x="390418" y="1356189"/>
-            <a:ext cx="8640870" cy="4397339"/>
+            <a:off x="248749" y="1345882"/>
+            <a:ext cx="5322057" cy="4171907"/>
           </a:xfrm>
-        </p:spPr>
-        <p:txBody>
-          <a:bodyPr/>
-          <a:lstStyle/>
-          <a:p>
-            <a:pPr marL="0" indent="0">
-              <a:spcBef>
-                <a:spcPts val="0"/>
-              </a:spcBef>
-              <a:buNone/>
-            </a:pPr>
-            <a:r>
-              <a:rPr lang="en-US" dirty="0" smtClean="0">
-                <a:latin typeface="Arial" pitchFamily="34" charset="0"/>
-                <a:cs typeface="Arial" pitchFamily="34" charset="0"/>
-              </a:rPr>
-              <a:t>DEMO</a:t>
-            </a:r>
-            <a:endParaRPr lang="en-US" dirty="0">
-              <a:latin typeface="Arial" pitchFamily="34" charset="0"/>
-              <a:cs typeface="Arial" pitchFamily="34" charset="0"/>
-            </a:endParaRPr>
-          </a:p>
-        </p:txBody>
-      </p:sp>
+          <a:prstGeom prst="rect">
+            <a:avLst/>
+          </a:prstGeom>
+        </p:spPr>
+      </p:pic>
     </p:spTree>
     <p:extLst>
       <p:ext uri="{BB962C8B-B14F-4D97-AF65-F5344CB8AC3E}">
-        <p14:creationId xmlns:p14="http://schemas.microsoft.com/office/powerpoint/2010/main" val="1741452563"/>
+        <p14:creationId xmlns:p14="http://schemas.microsoft.com/office/powerpoint/2010/main" val="3434753538"/>
       </p:ext>
     </p:extLst>
   </p:cSld>
@@ -8248,11 +8136,11 @@
           <a:lstStyle/>
           <a:p>
             <a:r>
-              <a:rPr lang="en-US" smtClean="0">
+              <a:rPr lang="en-US" dirty="0" smtClean="0">
                 <a:latin typeface="Arial" pitchFamily="34" charset="0"/>
                 <a:cs typeface="Arial" pitchFamily="34" charset="0"/>
               </a:rPr>
-              <a:t>Distribution of Charges</a:t>
+              <a:t>Installing SQL Server R Services, part 8</a:t>
             </a:r>
             <a:endParaRPr lang="en-US" dirty="0">
               <a:latin typeface="Arial" pitchFamily="34" charset="0"/>
@@ -8261,40 +8149,235 @@
           </a:p>
         </p:txBody>
       </p:sp>
-      <p:pic>
-        <p:nvPicPr>
-          <p:cNvPr id="3" name="Picture 2"/>
-          <p:cNvPicPr>
-            <a:picLocks noChangeAspect="1"/>
-          </p:cNvPicPr>
-          <p:nvPr/>
-        </p:nvPicPr>
-        <p:blipFill>
-          <a:blip r:embed="rId2">
-            <a:extLst>
-              <a:ext uri="{28A0092B-C50C-407E-A947-70E740481C1C}">
-                <a14:useLocalDpi xmlns:a14="http://schemas.microsoft.com/office/drawing/2010/main" val="0"/>
-              </a:ext>
-            </a:extLst>
-          </a:blip>
-          <a:stretch>
-            <a:fillRect/>
-          </a:stretch>
-        </p:blipFill>
+      <p:sp>
+        <p:nvSpPr>
+          <p:cNvPr id="3" name="Content Placeholder 2"/>
+          <p:cNvSpPr>
+            <a:spLocks noGrp="1"/>
+          </p:cNvSpPr>
+          <p:nvPr>
+            <p:ph idx="1"/>
+          </p:nvPr>
+        </p:nvSpPr>
         <p:spPr>
           <a:xfrm>
-            <a:off x="393896" y="1196975"/>
-            <a:ext cx="6682154" cy="4219087"/>
+            <a:off x="390418" y="1356189"/>
+            <a:ext cx="8640870" cy="4397339"/>
           </a:xfrm>
-          <a:prstGeom prst="rect">
-            <a:avLst/>
-          </a:prstGeom>
-        </p:spPr>
-      </p:pic>
+        </p:spPr>
+        <p:txBody>
+          <a:bodyPr/>
+          <a:lstStyle/>
+          <a:p>
+            <a:pPr marL="0" indent="0">
+              <a:spcBef>
+                <a:spcPts val="0"/>
+              </a:spcBef>
+              <a:buNone/>
+            </a:pPr>
+            <a:r>
+              <a:rPr lang="en-US" dirty="0" smtClean="0">
+                <a:latin typeface="Arial" pitchFamily="34" charset="0"/>
+                <a:cs typeface="Arial" pitchFamily="34" charset="0"/>
+              </a:rPr>
+              <a:t>Post-installation scripts and configuration</a:t>
+            </a:r>
+          </a:p>
+          <a:p>
+            <a:pPr marL="0" indent="0">
+              <a:spcBef>
+                <a:spcPts val="0"/>
+              </a:spcBef>
+              <a:buNone/>
+            </a:pPr>
+            <a:endParaRPr lang="en-US" dirty="0" smtClean="0">
+              <a:latin typeface="Arial" pitchFamily="34" charset="0"/>
+              <a:cs typeface="Arial" pitchFamily="34" charset="0"/>
+            </a:endParaRPr>
+          </a:p>
+          <a:p>
+            <a:pPr marL="0" indent="0">
+              <a:spcBef>
+                <a:spcPts val="0"/>
+              </a:spcBef>
+              <a:buNone/>
+            </a:pPr>
+            <a:r>
+              <a:rPr lang="en-US" dirty="0" smtClean="0">
+                <a:latin typeface="Arial" pitchFamily="34" charset="0"/>
+                <a:cs typeface="Arial" pitchFamily="34" charset="0"/>
+              </a:rPr>
+              <a:t>1.  Enable external scripts</a:t>
+            </a:r>
+            <a:endParaRPr lang="en-US" dirty="0">
+              <a:latin typeface="Arial" pitchFamily="34" charset="0"/>
+              <a:cs typeface="Arial" pitchFamily="34" charset="0"/>
+            </a:endParaRPr>
+          </a:p>
+          <a:p>
+            <a:pPr marL="0" indent="0">
+              <a:spcBef>
+                <a:spcPts val="0"/>
+              </a:spcBef>
+              <a:buNone/>
+            </a:pPr>
+            <a:r>
+              <a:rPr lang="en-US" sz="2000" dirty="0" smtClean="0">
+                <a:latin typeface="Courier New" panose="02070309020205020404" pitchFamily="49" charset="0"/>
+                <a:cs typeface="Courier New" panose="02070309020205020404" pitchFamily="49" charset="0"/>
+              </a:rPr>
+              <a:t>EXEC </a:t>
+            </a:r>
+            <a:r>
+              <a:rPr lang="en-US" sz="2000" dirty="0" err="1">
+                <a:latin typeface="Courier New" panose="02070309020205020404" pitchFamily="49" charset="0"/>
+                <a:cs typeface="Courier New" panose="02070309020205020404" pitchFamily="49" charset="0"/>
+              </a:rPr>
+              <a:t>sp_configure</a:t>
+            </a:r>
+            <a:r>
+              <a:rPr lang="en-US" sz="2000" dirty="0">
+                <a:latin typeface="Courier New" panose="02070309020205020404" pitchFamily="49" charset="0"/>
+                <a:cs typeface="Courier New" panose="02070309020205020404" pitchFamily="49" charset="0"/>
+              </a:rPr>
+              <a:t> 'external scripts enabled', 1; </a:t>
+            </a:r>
+          </a:p>
+          <a:p>
+            <a:pPr marL="0" indent="0">
+              <a:spcBef>
+                <a:spcPts val="0"/>
+              </a:spcBef>
+              <a:buNone/>
+            </a:pPr>
+            <a:r>
+              <a:rPr lang="en-US" sz="2000" dirty="0" smtClean="0">
+                <a:latin typeface="Courier New" panose="02070309020205020404" pitchFamily="49" charset="0"/>
+                <a:cs typeface="Courier New" panose="02070309020205020404" pitchFamily="49" charset="0"/>
+              </a:rPr>
+              <a:t>RECONFIGURE;</a:t>
+            </a:r>
+          </a:p>
+          <a:p>
+            <a:pPr marL="0" indent="0">
+              <a:spcBef>
+                <a:spcPts val="0"/>
+              </a:spcBef>
+              <a:buNone/>
+            </a:pPr>
+            <a:endParaRPr lang="en-US" dirty="0" smtClean="0">
+              <a:latin typeface="Arial" pitchFamily="34" charset="0"/>
+              <a:cs typeface="Arial" pitchFamily="34" charset="0"/>
+            </a:endParaRPr>
+          </a:p>
+          <a:p>
+            <a:pPr marL="0" indent="0">
+              <a:spcBef>
+                <a:spcPts val="0"/>
+              </a:spcBef>
+              <a:buNone/>
+            </a:pPr>
+            <a:r>
+              <a:rPr lang="en-US" dirty="0" smtClean="0">
+                <a:latin typeface="Arial" pitchFamily="34" charset="0"/>
+                <a:cs typeface="Arial" pitchFamily="34" charset="0"/>
+              </a:rPr>
+              <a:t>2.  Configure memory appropriately</a:t>
+            </a:r>
+          </a:p>
+          <a:p>
+            <a:pPr marL="0" indent="0">
+              <a:spcBef>
+                <a:spcPts val="0"/>
+              </a:spcBef>
+              <a:buNone/>
+            </a:pPr>
+            <a:endParaRPr lang="en-US" dirty="0" smtClean="0">
+              <a:latin typeface="Arial" pitchFamily="34" charset="0"/>
+              <a:cs typeface="Arial" pitchFamily="34" charset="0"/>
+            </a:endParaRPr>
+          </a:p>
+          <a:p>
+            <a:pPr marL="0" indent="0">
+              <a:spcBef>
+                <a:spcPts val="0"/>
+              </a:spcBef>
+              <a:buNone/>
+            </a:pPr>
+            <a:r>
+              <a:rPr lang="en-US" dirty="0" smtClean="0">
+                <a:latin typeface="Arial" pitchFamily="34" charset="0"/>
+                <a:cs typeface="Arial" pitchFamily="34" charset="0"/>
+              </a:rPr>
+              <a:t>3.  Post-installation command script</a:t>
+            </a:r>
+          </a:p>
+          <a:p>
+            <a:pPr marL="0" indent="0">
+              <a:spcBef>
+                <a:spcPts val="0"/>
+              </a:spcBef>
+              <a:buNone/>
+            </a:pPr>
+            <a:endParaRPr lang="en-US" dirty="0">
+              <a:latin typeface="Arial" pitchFamily="34" charset="0"/>
+              <a:cs typeface="Arial" pitchFamily="34" charset="0"/>
+            </a:endParaRPr>
+          </a:p>
+          <a:p>
+            <a:pPr marL="0" indent="0">
+              <a:spcBef>
+                <a:spcPts val="0"/>
+              </a:spcBef>
+              <a:buNone/>
+            </a:pPr>
+            <a:r>
+              <a:rPr lang="en-US" dirty="0" smtClean="0">
+                <a:latin typeface="Arial" pitchFamily="34" charset="0"/>
+                <a:cs typeface="Arial" pitchFamily="34" charset="0"/>
+                <a:hlinkClick r:id="rId2"/>
+              </a:rPr>
+              <a:t>https</a:t>
+            </a:r>
+            <a:r>
+              <a:rPr lang="en-US" dirty="0">
+                <a:latin typeface="Arial" pitchFamily="34" charset="0"/>
+                <a:cs typeface="Arial" pitchFamily="34" charset="0"/>
+                <a:hlinkClick r:id="rId2"/>
+              </a:rPr>
+              <a:t>://</a:t>
+            </a:r>
+            <a:r>
+              <a:rPr lang="en-US" dirty="0" smtClean="0">
+                <a:latin typeface="Arial" pitchFamily="34" charset="0"/>
+                <a:cs typeface="Arial" pitchFamily="34" charset="0"/>
+                <a:hlinkClick r:id="rId2"/>
+              </a:rPr>
+              <a:t>msdn.microsoft.com/en-US/library/mt590536.aspx</a:t>
+            </a:r>
+            <a:endParaRPr lang="en-US" dirty="0">
+              <a:latin typeface="Arial" pitchFamily="34" charset="0"/>
+              <a:cs typeface="Arial" pitchFamily="34" charset="0"/>
+            </a:endParaRPr>
+          </a:p>
+          <a:p>
+            <a:pPr marL="0" indent="0">
+              <a:spcBef>
+                <a:spcPts val="0"/>
+              </a:spcBef>
+              <a:buNone/>
+            </a:pPr>
+            <a:endParaRPr lang="en-US" dirty="0" smtClean="0">
+              <a:latin typeface="Arial" pitchFamily="34" charset="0"/>
+              <a:cs typeface="Arial" pitchFamily="34" charset="0"/>
+            </a:endParaRPr>
+          </a:p>
+        </p:txBody>
+      </p:sp>
     </p:spTree>
     <p:extLst>
       <p:ext uri="{BB962C8B-B14F-4D97-AF65-F5344CB8AC3E}">
-        <p14:creationId xmlns:p14="http://schemas.microsoft.com/office/powerpoint/2010/main" val="1252800610"/>
+        <p14:creationId xmlns:p14="http://schemas.microsoft.com/office/powerpoint/2010/main" val="2880793802"/>
       </p:ext>
     </p:extLst>
   </p:cSld>
@@ -8353,59 +8436,52 @@
                 <a:latin typeface="Arial" pitchFamily="34" charset="0"/>
                 <a:cs typeface="Arial" pitchFamily="34" charset="0"/>
               </a:rPr>
-              <a:t>Distribution of Charges</a:t>
-            </a:r>
-            <a:endParaRPr lang="en-US" dirty="0">
-              <a:latin typeface="Arial" pitchFamily="34" charset="0"/>
-              <a:cs typeface="Arial" pitchFamily="34" charset="0"/>
-            </a:endParaRPr>
-          </a:p>
-        </p:txBody>
-      </p:sp>
-      <p:sp>
-        <p:nvSpPr>
-          <p:cNvPr id="3" name="Content Placeholder 2"/>
-          <p:cNvSpPr>
-            <a:spLocks noGrp="1"/>
-          </p:cNvSpPr>
-          <p:nvPr>
-            <p:ph idx="1"/>
-          </p:nvPr>
-        </p:nvSpPr>
-        <p:spPr>
-          <a:xfrm>
-            <a:off x="390418" y="1356189"/>
-            <a:ext cx="8640870" cy="4397339"/>
-          </a:xfrm>
-        </p:spPr>
-        <p:txBody>
-          <a:bodyPr/>
-          <a:lstStyle/>
-          <a:p>
-            <a:pPr marL="0" indent="0">
-              <a:spcBef>
-                <a:spcPts val="0"/>
-              </a:spcBef>
-              <a:buNone/>
-            </a:pPr>
-            <a:r>
-              <a:rPr lang="en-US" dirty="0" smtClean="0">
+              <a:t>Installing SQL Server R Services, part </a:t>
+            </a:r>
+            <a:r>
+              <a:rPr lang="en-US" dirty="0">
                 <a:latin typeface="Arial" pitchFamily="34" charset="0"/>
                 <a:cs typeface="Arial" pitchFamily="34" charset="0"/>
               </a:rPr>
-              <a:t>DEMO</a:t>
-            </a:r>
-            <a:endParaRPr lang="en-US" dirty="0">
-              <a:latin typeface="Arial" pitchFamily="34" charset="0"/>
-              <a:cs typeface="Arial" pitchFamily="34" charset="0"/>
-            </a:endParaRPr>
+              <a:t>9</a:t>
+            </a:r>
           </a:p>
         </p:txBody>
       </p:sp>
+      <p:pic>
+        <p:nvPicPr>
+          <p:cNvPr id="3" name="Picture 2"/>
+          <p:cNvPicPr>
+            <a:picLocks noChangeAspect="1"/>
+          </p:cNvPicPr>
+          <p:nvPr/>
+        </p:nvPicPr>
+        <p:blipFill>
+          <a:blip r:embed="rId2">
+            <a:extLst>
+              <a:ext uri="{28A0092B-C50C-407E-A947-70E740481C1C}">
+                <a14:useLocalDpi xmlns:a14="http://schemas.microsoft.com/office/drawing/2010/main" val="0"/>
+              </a:ext>
+            </a:extLst>
+          </a:blip>
+          <a:stretch>
+            <a:fillRect/>
+          </a:stretch>
+        </p:blipFill>
+        <p:spPr>
+          <a:xfrm>
+            <a:off x="316303" y="1383982"/>
+            <a:ext cx="4980805" cy="4032080"/>
+          </a:xfrm>
+          <a:prstGeom prst="rect">
+            <a:avLst/>
+          </a:prstGeom>
+        </p:spPr>
+      </p:pic>
     </p:spTree>
     <p:extLst>
       <p:ext uri="{BB962C8B-B14F-4D97-AF65-F5344CB8AC3E}">
-        <p14:creationId xmlns:p14="http://schemas.microsoft.com/office/powerpoint/2010/main" val="1986777882"/>
+        <p14:creationId xmlns:p14="http://schemas.microsoft.com/office/powerpoint/2010/main" val="585259203"/>
       </p:ext>
     </p:extLst>
   </p:cSld>
@@ -8460,11 +8536,11 @@
           <a:lstStyle/>
           <a:p>
             <a:r>
-              <a:rPr lang="en-US" smtClean="0">
+              <a:rPr lang="en-US" dirty="0" smtClean="0">
                 <a:latin typeface="Arial" pitchFamily="34" charset="0"/>
                 <a:cs typeface="Arial" pitchFamily="34" charset="0"/>
               </a:rPr>
-              <a:t>Overbooking</a:t>
+              <a:t>Installing SQL Server R Services, part 10</a:t>
             </a:r>
             <a:endParaRPr lang="en-US" dirty="0">
               <a:latin typeface="Arial" pitchFamily="34" charset="0"/>
@@ -8473,50 +8549,40 @@
           </a:p>
         </p:txBody>
       </p:sp>
-      <p:sp>
-        <p:nvSpPr>
-          <p:cNvPr id="3" name="Content Placeholder 2"/>
-          <p:cNvSpPr>
-            <a:spLocks noGrp="1"/>
-          </p:cNvSpPr>
-          <p:nvPr>
-            <p:ph idx="1"/>
-          </p:nvPr>
-        </p:nvSpPr>
+      <p:pic>
+        <p:nvPicPr>
+          <p:cNvPr id="4" name="Picture 3"/>
+          <p:cNvPicPr>
+            <a:picLocks noChangeAspect="1"/>
+          </p:cNvPicPr>
+          <p:nvPr/>
+        </p:nvPicPr>
+        <p:blipFill>
+          <a:blip r:embed="rId2">
+            <a:extLst>
+              <a:ext uri="{28A0092B-C50C-407E-A947-70E740481C1C}">
+                <a14:useLocalDpi xmlns:a14="http://schemas.microsoft.com/office/drawing/2010/main" val="0"/>
+              </a:ext>
+            </a:extLst>
+          </a:blip>
+          <a:stretch>
+            <a:fillRect/>
+          </a:stretch>
+        </p:blipFill>
         <p:spPr>
           <a:xfrm>
-            <a:off x="390418" y="1356189"/>
-            <a:ext cx="8640870" cy="4397339"/>
+            <a:off x="292710" y="1387499"/>
+            <a:ext cx="8062484" cy="4084833"/>
           </a:xfrm>
-        </p:spPr>
-        <p:txBody>
-          <a:bodyPr/>
-          <a:lstStyle/>
-          <a:p>
-            <a:pPr marL="0" indent="0">
-              <a:spcBef>
-                <a:spcPts val="0"/>
-              </a:spcBef>
-              <a:buNone/>
-            </a:pPr>
-            <a:r>
-              <a:rPr lang="en-US" dirty="0" smtClean="0">
-                <a:latin typeface="Arial" pitchFamily="34" charset="0"/>
-                <a:cs typeface="Arial" pitchFamily="34" charset="0"/>
-              </a:rPr>
-              <a:t>DEMO</a:t>
-            </a:r>
-            <a:endParaRPr lang="en-US" dirty="0">
-              <a:latin typeface="Arial" pitchFamily="34" charset="0"/>
-              <a:cs typeface="Arial" pitchFamily="34" charset="0"/>
-            </a:endParaRPr>
-          </a:p>
-        </p:txBody>
-      </p:sp>
+          <a:prstGeom prst="rect">
+            <a:avLst/>
+          </a:prstGeom>
+        </p:spPr>
+      </p:pic>
     </p:spTree>
     <p:extLst>
       <p:ext uri="{BB962C8B-B14F-4D97-AF65-F5344CB8AC3E}">
-        <p14:creationId xmlns:p14="http://schemas.microsoft.com/office/powerpoint/2010/main" val="315174550"/>
+        <p14:creationId xmlns:p14="http://schemas.microsoft.com/office/powerpoint/2010/main" val="2729895670"/>
       </p:ext>
     </p:extLst>
   </p:cSld>
@@ -8758,6 +8824,440 @@
 </p:sld>
 </file>
 
+<file path=ppt/slides/slide20.xml><?xml version="1.0" encoding="utf-8"?>
+<p:sld xmlns:a="http://schemas.openxmlformats.org/drawingml/2006/main" xmlns:r="http://schemas.openxmlformats.org/officeDocument/2006/relationships" xmlns:p="http://schemas.openxmlformats.org/presentationml/2006/main">
+  <p:cSld>
+    <p:spTree>
+      <p:nvGrpSpPr>
+        <p:cNvPr id="1" name=""/>
+        <p:cNvGrpSpPr/>
+        <p:nvPr/>
+      </p:nvGrpSpPr>
+      <p:grpSpPr>
+        <a:xfrm>
+          <a:off x="0" y="0"/>
+          <a:ext cx="0" cy="0"/>
+          <a:chOff x="0" y="0"/>
+          <a:chExt cx="0" cy="0"/>
+        </a:xfrm>
+      </p:grpSpPr>
+      <p:sp>
+        <p:nvSpPr>
+          <p:cNvPr id="2" name="Title 1"/>
+          <p:cNvSpPr>
+            <a:spLocks noGrp="1"/>
+          </p:cNvSpPr>
+          <p:nvPr>
+            <p:ph type="title"/>
+          </p:nvPr>
+        </p:nvSpPr>
+        <p:spPr>
+          <a:xfrm>
+            <a:off x="513708" y="58738"/>
+            <a:ext cx="8517580" cy="1138237"/>
+          </a:xfrm>
+        </p:spPr>
+        <p:txBody>
+          <a:bodyPr/>
+          <a:lstStyle/>
+          <a:p>
+            <a:r>
+              <a:rPr lang="en-US" dirty="0" smtClean="0">
+                <a:latin typeface="Arial" pitchFamily="34" charset="0"/>
+                <a:cs typeface="Arial" pitchFamily="34" charset="0"/>
+              </a:rPr>
+              <a:t>Getting Data Into and Out Of R</a:t>
+            </a:r>
+            <a:endParaRPr lang="en-US" dirty="0">
+              <a:latin typeface="Arial" pitchFamily="34" charset="0"/>
+              <a:cs typeface="Arial" pitchFamily="34" charset="0"/>
+            </a:endParaRPr>
+          </a:p>
+        </p:txBody>
+      </p:sp>
+      <p:sp>
+        <p:nvSpPr>
+          <p:cNvPr id="3" name="Content Placeholder 2"/>
+          <p:cNvSpPr>
+            <a:spLocks noGrp="1"/>
+          </p:cNvSpPr>
+          <p:nvPr>
+            <p:ph idx="1"/>
+          </p:nvPr>
+        </p:nvSpPr>
+        <p:spPr>
+          <a:xfrm>
+            <a:off x="390418" y="1356189"/>
+            <a:ext cx="8640870" cy="4397339"/>
+          </a:xfrm>
+        </p:spPr>
+        <p:txBody>
+          <a:bodyPr/>
+          <a:lstStyle/>
+          <a:p>
+            <a:pPr marL="0" indent="0">
+              <a:spcBef>
+                <a:spcPts val="0"/>
+              </a:spcBef>
+              <a:buNone/>
+            </a:pPr>
+            <a:r>
+              <a:rPr lang="en-US" dirty="0" smtClean="0">
+                <a:latin typeface="Arial" pitchFamily="34" charset="0"/>
+                <a:cs typeface="Arial" pitchFamily="34" charset="0"/>
+              </a:rPr>
+              <a:t>DEMO</a:t>
+            </a:r>
+            <a:endParaRPr lang="en-US" dirty="0">
+              <a:latin typeface="Arial" pitchFamily="34" charset="0"/>
+              <a:cs typeface="Arial" pitchFamily="34" charset="0"/>
+            </a:endParaRPr>
+          </a:p>
+        </p:txBody>
+      </p:sp>
+    </p:spTree>
+    <p:extLst>
+      <p:ext uri="{BB962C8B-B14F-4D97-AF65-F5344CB8AC3E}">
+        <p14:creationId xmlns:p14="http://schemas.microsoft.com/office/powerpoint/2010/main" val="1741452563"/>
+      </p:ext>
+    </p:extLst>
+  </p:cSld>
+  <p:clrMapOvr>
+    <a:masterClrMapping/>
+  </p:clrMapOvr>
+  <p:timing>
+    <p:tnLst>
+      <p:par>
+        <p:cTn id="1" dur="indefinite" restart="never" nodeType="tmRoot"/>
+      </p:par>
+    </p:tnLst>
+  </p:timing>
+</p:sld>
+</file>
+
+<file path=ppt/slides/slide21.xml><?xml version="1.0" encoding="utf-8"?>
+<p:sld xmlns:a="http://schemas.openxmlformats.org/drawingml/2006/main" xmlns:r="http://schemas.openxmlformats.org/officeDocument/2006/relationships" xmlns:p="http://schemas.openxmlformats.org/presentationml/2006/main">
+  <p:cSld>
+    <p:spTree>
+      <p:nvGrpSpPr>
+        <p:cNvPr id="1" name=""/>
+        <p:cNvGrpSpPr/>
+        <p:nvPr/>
+      </p:nvGrpSpPr>
+      <p:grpSpPr>
+        <a:xfrm>
+          <a:off x="0" y="0"/>
+          <a:ext cx="0" cy="0"/>
+          <a:chOff x="0" y="0"/>
+          <a:chExt cx="0" cy="0"/>
+        </a:xfrm>
+      </p:grpSpPr>
+      <p:sp>
+        <p:nvSpPr>
+          <p:cNvPr id="2" name="Title 1"/>
+          <p:cNvSpPr>
+            <a:spLocks noGrp="1"/>
+          </p:cNvSpPr>
+          <p:nvPr>
+            <p:ph type="title"/>
+          </p:nvPr>
+        </p:nvSpPr>
+        <p:spPr>
+          <a:xfrm>
+            <a:off x="513708" y="58738"/>
+            <a:ext cx="8517580" cy="1138237"/>
+          </a:xfrm>
+        </p:spPr>
+        <p:txBody>
+          <a:bodyPr/>
+          <a:lstStyle/>
+          <a:p>
+            <a:r>
+              <a:rPr lang="en-US" smtClean="0">
+                <a:latin typeface="Arial" pitchFamily="34" charset="0"/>
+                <a:cs typeface="Arial" pitchFamily="34" charset="0"/>
+              </a:rPr>
+              <a:t>Distribution of Charges</a:t>
+            </a:r>
+            <a:endParaRPr lang="en-US" dirty="0">
+              <a:latin typeface="Arial" pitchFamily="34" charset="0"/>
+              <a:cs typeface="Arial" pitchFamily="34" charset="0"/>
+            </a:endParaRPr>
+          </a:p>
+        </p:txBody>
+      </p:sp>
+      <p:pic>
+        <p:nvPicPr>
+          <p:cNvPr id="3" name="Picture 2"/>
+          <p:cNvPicPr>
+            <a:picLocks noChangeAspect="1"/>
+          </p:cNvPicPr>
+          <p:nvPr/>
+        </p:nvPicPr>
+        <p:blipFill>
+          <a:blip r:embed="rId2">
+            <a:extLst>
+              <a:ext uri="{28A0092B-C50C-407E-A947-70E740481C1C}">
+                <a14:useLocalDpi xmlns:a14="http://schemas.microsoft.com/office/drawing/2010/main" val="0"/>
+              </a:ext>
+            </a:extLst>
+          </a:blip>
+          <a:stretch>
+            <a:fillRect/>
+          </a:stretch>
+        </p:blipFill>
+        <p:spPr>
+          <a:xfrm>
+            <a:off x="393896" y="1196975"/>
+            <a:ext cx="6682154" cy="4219087"/>
+          </a:xfrm>
+          <a:prstGeom prst="rect">
+            <a:avLst/>
+          </a:prstGeom>
+        </p:spPr>
+      </p:pic>
+    </p:spTree>
+    <p:extLst>
+      <p:ext uri="{BB962C8B-B14F-4D97-AF65-F5344CB8AC3E}">
+        <p14:creationId xmlns:p14="http://schemas.microsoft.com/office/powerpoint/2010/main" val="1252800610"/>
+      </p:ext>
+    </p:extLst>
+  </p:cSld>
+  <p:clrMapOvr>
+    <a:masterClrMapping/>
+  </p:clrMapOvr>
+  <p:timing>
+    <p:tnLst>
+      <p:par>
+        <p:cTn id="1" dur="indefinite" restart="never" nodeType="tmRoot"/>
+      </p:par>
+    </p:tnLst>
+  </p:timing>
+</p:sld>
+</file>
+
+<file path=ppt/slides/slide22.xml><?xml version="1.0" encoding="utf-8"?>
+<p:sld xmlns:a="http://schemas.openxmlformats.org/drawingml/2006/main" xmlns:r="http://schemas.openxmlformats.org/officeDocument/2006/relationships" xmlns:p="http://schemas.openxmlformats.org/presentationml/2006/main">
+  <p:cSld>
+    <p:spTree>
+      <p:nvGrpSpPr>
+        <p:cNvPr id="1" name=""/>
+        <p:cNvGrpSpPr/>
+        <p:nvPr/>
+      </p:nvGrpSpPr>
+      <p:grpSpPr>
+        <a:xfrm>
+          <a:off x="0" y="0"/>
+          <a:ext cx="0" cy="0"/>
+          <a:chOff x="0" y="0"/>
+          <a:chExt cx="0" cy="0"/>
+        </a:xfrm>
+      </p:grpSpPr>
+      <p:sp>
+        <p:nvSpPr>
+          <p:cNvPr id="2" name="Title 1"/>
+          <p:cNvSpPr>
+            <a:spLocks noGrp="1"/>
+          </p:cNvSpPr>
+          <p:nvPr>
+            <p:ph type="title"/>
+          </p:nvPr>
+        </p:nvSpPr>
+        <p:spPr>
+          <a:xfrm>
+            <a:off x="513708" y="58738"/>
+            <a:ext cx="8517580" cy="1138237"/>
+          </a:xfrm>
+        </p:spPr>
+        <p:txBody>
+          <a:bodyPr/>
+          <a:lstStyle/>
+          <a:p>
+            <a:r>
+              <a:rPr lang="en-US" dirty="0" smtClean="0">
+                <a:latin typeface="Arial" pitchFamily="34" charset="0"/>
+                <a:cs typeface="Arial" pitchFamily="34" charset="0"/>
+              </a:rPr>
+              <a:t>Distribution of Charges</a:t>
+            </a:r>
+            <a:endParaRPr lang="en-US" dirty="0">
+              <a:latin typeface="Arial" pitchFamily="34" charset="0"/>
+              <a:cs typeface="Arial" pitchFamily="34" charset="0"/>
+            </a:endParaRPr>
+          </a:p>
+        </p:txBody>
+      </p:sp>
+      <p:sp>
+        <p:nvSpPr>
+          <p:cNvPr id="3" name="Content Placeholder 2"/>
+          <p:cNvSpPr>
+            <a:spLocks noGrp="1"/>
+          </p:cNvSpPr>
+          <p:nvPr>
+            <p:ph idx="1"/>
+          </p:nvPr>
+        </p:nvSpPr>
+        <p:spPr>
+          <a:xfrm>
+            <a:off x="390418" y="1356189"/>
+            <a:ext cx="8640870" cy="4397339"/>
+          </a:xfrm>
+        </p:spPr>
+        <p:txBody>
+          <a:bodyPr/>
+          <a:lstStyle/>
+          <a:p>
+            <a:pPr marL="0" indent="0">
+              <a:spcBef>
+                <a:spcPts val="0"/>
+              </a:spcBef>
+              <a:buNone/>
+            </a:pPr>
+            <a:r>
+              <a:rPr lang="en-US" dirty="0" smtClean="0">
+                <a:latin typeface="Arial" pitchFamily="34" charset="0"/>
+                <a:cs typeface="Arial" pitchFamily="34" charset="0"/>
+              </a:rPr>
+              <a:t>DEMO</a:t>
+            </a:r>
+            <a:endParaRPr lang="en-US" dirty="0">
+              <a:latin typeface="Arial" pitchFamily="34" charset="0"/>
+              <a:cs typeface="Arial" pitchFamily="34" charset="0"/>
+            </a:endParaRPr>
+          </a:p>
+        </p:txBody>
+      </p:sp>
+    </p:spTree>
+    <p:extLst>
+      <p:ext uri="{BB962C8B-B14F-4D97-AF65-F5344CB8AC3E}">
+        <p14:creationId xmlns:p14="http://schemas.microsoft.com/office/powerpoint/2010/main" val="1986777882"/>
+      </p:ext>
+    </p:extLst>
+  </p:cSld>
+  <p:clrMapOvr>
+    <a:masterClrMapping/>
+  </p:clrMapOvr>
+  <p:timing>
+    <p:tnLst>
+      <p:par>
+        <p:cTn id="1" dur="indefinite" restart="never" nodeType="tmRoot"/>
+      </p:par>
+    </p:tnLst>
+  </p:timing>
+</p:sld>
+</file>
+
+<file path=ppt/slides/slide23.xml><?xml version="1.0" encoding="utf-8"?>
+<p:sld xmlns:a="http://schemas.openxmlformats.org/drawingml/2006/main" xmlns:r="http://schemas.openxmlformats.org/officeDocument/2006/relationships" xmlns:p="http://schemas.openxmlformats.org/presentationml/2006/main">
+  <p:cSld>
+    <p:spTree>
+      <p:nvGrpSpPr>
+        <p:cNvPr id="1" name=""/>
+        <p:cNvGrpSpPr/>
+        <p:nvPr/>
+      </p:nvGrpSpPr>
+      <p:grpSpPr>
+        <a:xfrm>
+          <a:off x="0" y="0"/>
+          <a:ext cx="0" cy="0"/>
+          <a:chOff x="0" y="0"/>
+          <a:chExt cx="0" cy="0"/>
+        </a:xfrm>
+      </p:grpSpPr>
+      <p:sp>
+        <p:nvSpPr>
+          <p:cNvPr id="2" name="Title 1"/>
+          <p:cNvSpPr>
+            <a:spLocks noGrp="1"/>
+          </p:cNvSpPr>
+          <p:nvPr>
+            <p:ph type="title"/>
+          </p:nvPr>
+        </p:nvSpPr>
+        <p:spPr>
+          <a:xfrm>
+            <a:off x="513708" y="58738"/>
+            <a:ext cx="8517580" cy="1138237"/>
+          </a:xfrm>
+        </p:spPr>
+        <p:txBody>
+          <a:bodyPr/>
+          <a:lstStyle/>
+          <a:p>
+            <a:r>
+              <a:rPr lang="en-US" smtClean="0">
+                <a:latin typeface="Arial" pitchFamily="34" charset="0"/>
+                <a:cs typeface="Arial" pitchFamily="34" charset="0"/>
+              </a:rPr>
+              <a:t>Overbooking</a:t>
+            </a:r>
+            <a:endParaRPr lang="en-US" dirty="0">
+              <a:latin typeface="Arial" pitchFamily="34" charset="0"/>
+              <a:cs typeface="Arial" pitchFamily="34" charset="0"/>
+            </a:endParaRPr>
+          </a:p>
+        </p:txBody>
+      </p:sp>
+      <p:sp>
+        <p:nvSpPr>
+          <p:cNvPr id="3" name="Content Placeholder 2"/>
+          <p:cNvSpPr>
+            <a:spLocks noGrp="1"/>
+          </p:cNvSpPr>
+          <p:nvPr>
+            <p:ph idx="1"/>
+          </p:nvPr>
+        </p:nvSpPr>
+        <p:spPr>
+          <a:xfrm>
+            <a:off x="390418" y="1356189"/>
+            <a:ext cx="8640870" cy="4397339"/>
+          </a:xfrm>
+        </p:spPr>
+        <p:txBody>
+          <a:bodyPr/>
+          <a:lstStyle/>
+          <a:p>
+            <a:pPr marL="0" indent="0">
+              <a:spcBef>
+                <a:spcPts val="0"/>
+              </a:spcBef>
+              <a:buNone/>
+            </a:pPr>
+            <a:r>
+              <a:rPr lang="en-US" dirty="0" smtClean="0">
+                <a:latin typeface="Arial" pitchFamily="34" charset="0"/>
+                <a:cs typeface="Arial" pitchFamily="34" charset="0"/>
+              </a:rPr>
+              <a:t>DEMO</a:t>
+            </a:r>
+            <a:endParaRPr lang="en-US" dirty="0">
+              <a:latin typeface="Arial" pitchFamily="34" charset="0"/>
+              <a:cs typeface="Arial" pitchFamily="34" charset="0"/>
+            </a:endParaRPr>
+          </a:p>
+        </p:txBody>
+      </p:sp>
+    </p:spTree>
+    <p:extLst>
+      <p:ext uri="{BB962C8B-B14F-4D97-AF65-F5344CB8AC3E}">
+        <p14:creationId xmlns:p14="http://schemas.microsoft.com/office/powerpoint/2010/main" val="315174550"/>
+      </p:ext>
+    </p:extLst>
+  </p:cSld>
+  <p:clrMapOvr>
+    <a:masterClrMapping/>
+  </p:clrMapOvr>
+  <p:timing>
+    <p:tnLst>
+      <p:par>
+        <p:cTn id="1" dur="indefinite" restart="never" nodeType="tmRoot"/>
+      </p:par>
+    </p:tnLst>
+  </p:timing>
+</p:sld>
+</file>
+
 <file path=ppt/slides/slide3.xml><?xml version="1.0" encoding="utf-8"?>
 <p:sld xmlns:a="http://schemas.openxmlformats.org/drawingml/2006/main" xmlns:r="http://schemas.openxmlformats.org/officeDocument/2006/relationships" xmlns:p="http://schemas.openxmlformats.org/presentationml/2006/main">
   <p:cSld>
@@ -8800,7 +9300,21 @@
                 <a:latin typeface="Arial" pitchFamily="34" charset="0"/>
                 <a:cs typeface="Arial" pitchFamily="34" charset="0"/>
               </a:rPr>
-              <a:t>R</a:t>
+              <a:t>Before we </a:t>
+            </a:r>
+            <a:r>
+              <a:rPr lang="en-US" dirty="0">
+                <a:latin typeface="Arial" pitchFamily="34" charset="0"/>
+                <a:cs typeface="Arial" pitchFamily="34" charset="0"/>
+              </a:rPr>
+              <a:t>b</a:t>
+            </a:r>
+            <a:r>
+              <a:rPr lang="en-US" dirty="0" smtClean="0">
+                <a:latin typeface="Arial" pitchFamily="34" charset="0"/>
+                <a:cs typeface="Arial" pitchFamily="34" charset="0"/>
+              </a:rPr>
+              <a:t>egin…</a:t>
             </a:r>
             <a:endParaRPr lang="en-US" dirty="0">
               <a:latin typeface="Arial" pitchFamily="34" charset="0"/>
@@ -8809,42 +9323,9 @@
           </a:p>
         </p:txBody>
       </p:sp>
-      <p:sp>
-        <p:nvSpPr>
-          <p:cNvPr id="3" name="Rectangle 2"/>
-          <p:cNvSpPr/>
-          <p:nvPr/>
-        </p:nvSpPr>
-        <p:spPr>
-          <a:xfrm>
-            <a:off x="513708" y="5143473"/>
-            <a:ext cx="1467261" cy="369332"/>
-          </a:xfrm>
-          <a:prstGeom prst="rect">
-            <a:avLst/>
-          </a:prstGeom>
-        </p:spPr>
-        <p:txBody>
-          <a:bodyPr wrap="none">
-            <a:spAutoFit/>
-          </a:bodyPr>
-          <a:lstStyle/>
-          <a:p>
-            <a:r>
-              <a:rPr lang="en-US" dirty="0" smtClean="0"/>
-              <a:t>Source:  </a:t>
-            </a:r>
-            <a:r>
-              <a:rPr lang="en-US" dirty="0" smtClean="0"/>
-              <a:t>TBD</a:t>
-            </a:r>
-            <a:endParaRPr lang="en-US" dirty="0"/>
-          </a:p>
-        </p:txBody>
-      </p:sp>
       <p:pic>
         <p:nvPicPr>
-          <p:cNvPr id="4" name="Picture 3"/>
+          <p:cNvPr id="5" name="Picture 4"/>
           <p:cNvPicPr>
             <a:picLocks noChangeAspect="1"/>
           </p:cNvPicPr>
@@ -8864,8 +9345,8 @@
         </p:blipFill>
         <p:spPr>
           <a:xfrm>
-            <a:off x="295422" y="1320166"/>
-            <a:ext cx="5120640" cy="3446585"/>
+            <a:off x="1681325" y="1517772"/>
+            <a:ext cx="5527005" cy="3799816"/>
           </a:xfrm>
           <a:prstGeom prst="rect">
             <a:avLst/>
@@ -8934,7 +9415,7 @@
                 <a:latin typeface="Arial" pitchFamily="34" charset="0"/>
                 <a:cs typeface="Arial" pitchFamily="34" charset="0"/>
               </a:rPr>
-              <a:t>R</a:t>
+              <a:t>What is this R you speak of?</a:t>
             </a:r>
             <a:endParaRPr lang="en-US" dirty="0">
               <a:latin typeface="Arial" pitchFamily="34" charset="0"/>
@@ -8945,71 +9426,210 @@
       </p:sp>
       <p:sp>
         <p:nvSpPr>
-          <p:cNvPr id="3" name="Rectangle 2"/>
-          <p:cNvSpPr/>
-          <p:nvPr/>
+          <p:cNvPr id="3" name="Content Placeholder 2"/>
+          <p:cNvSpPr>
+            <a:spLocks noGrp="1"/>
+          </p:cNvSpPr>
+          <p:nvPr>
+            <p:ph idx="1"/>
+          </p:nvPr>
         </p:nvSpPr>
         <p:spPr>
           <a:xfrm>
-            <a:off x="513708" y="5143473"/>
-            <a:ext cx="1467261" cy="369332"/>
+            <a:off x="390418" y="1356189"/>
+            <a:ext cx="8640870" cy="4397339"/>
           </a:xfrm>
-          <a:prstGeom prst="rect">
-            <a:avLst/>
-          </a:prstGeom>
         </p:spPr>
         <p:txBody>
-          <a:bodyPr wrap="none">
-            <a:spAutoFit/>
-          </a:bodyPr>
+          <a:bodyPr/>
           <a:lstStyle/>
           <a:p>
-            <a:r>
-              <a:rPr lang="en-US" dirty="0" smtClean="0"/>
-              <a:t>Source:  </a:t>
-            </a:r>
-            <a:r>
-              <a:rPr lang="en-US" dirty="0" smtClean="0"/>
-              <a:t>TBD</a:t>
-            </a:r>
-            <a:endParaRPr lang="en-US" dirty="0"/>
+            <a:pPr marL="0" indent="0">
+              <a:spcBef>
+                <a:spcPts val="0"/>
+              </a:spcBef>
+              <a:buNone/>
+            </a:pPr>
+            <a:r>
+              <a:rPr lang="en-US" dirty="0" smtClean="0">
+                <a:latin typeface="Arial" pitchFamily="34" charset="0"/>
+                <a:cs typeface="Arial" pitchFamily="34" charset="0"/>
+              </a:rPr>
+              <a:t>“R </a:t>
+            </a:r>
+            <a:r>
+              <a:rPr lang="en-US" dirty="0">
+                <a:latin typeface="Arial" pitchFamily="34" charset="0"/>
+                <a:cs typeface="Arial" pitchFamily="34" charset="0"/>
+              </a:rPr>
+              <a:t>is a language and environment for statistical computing and </a:t>
+            </a:r>
+            <a:r>
+              <a:rPr lang="en-US" dirty="0" smtClean="0">
+                <a:latin typeface="Arial" pitchFamily="34" charset="0"/>
+                <a:cs typeface="Arial" pitchFamily="34" charset="0"/>
+              </a:rPr>
+              <a:t>graphics.”</a:t>
+            </a:r>
+          </a:p>
+          <a:p>
+            <a:pPr marL="0" indent="0">
+              <a:spcBef>
+                <a:spcPts val="0"/>
+              </a:spcBef>
+              <a:buNone/>
+            </a:pPr>
+            <a:endParaRPr lang="en-US" dirty="0">
+              <a:latin typeface="Arial" pitchFamily="34" charset="0"/>
+              <a:cs typeface="Arial" pitchFamily="34" charset="0"/>
+            </a:endParaRPr>
+          </a:p>
+          <a:p>
+            <a:pPr marL="0" indent="0">
+              <a:spcBef>
+                <a:spcPts val="0"/>
+              </a:spcBef>
+              <a:buNone/>
+            </a:pPr>
+            <a:r>
+              <a:rPr lang="en-US" dirty="0">
+                <a:latin typeface="Arial" pitchFamily="34" charset="0"/>
+                <a:cs typeface="Arial" pitchFamily="34" charset="0"/>
+              </a:rPr>
+              <a:t>“R provides a wide variety of statistical </a:t>
+            </a:r>
+            <a:r>
+              <a:rPr lang="en-US" dirty="0" smtClean="0">
+                <a:latin typeface="Arial" pitchFamily="34" charset="0"/>
+                <a:cs typeface="Arial" pitchFamily="34" charset="0"/>
+              </a:rPr>
+              <a:t>and </a:t>
+            </a:r>
+            <a:r>
+              <a:rPr lang="en-US" dirty="0">
+                <a:latin typeface="Arial" pitchFamily="34" charset="0"/>
+                <a:cs typeface="Arial" pitchFamily="34" charset="0"/>
+              </a:rPr>
+              <a:t>graphical techniques, and is highly </a:t>
+            </a:r>
+            <a:r>
+              <a:rPr lang="en-US" dirty="0" smtClean="0">
+                <a:latin typeface="Arial" pitchFamily="34" charset="0"/>
+                <a:cs typeface="Arial" pitchFamily="34" charset="0"/>
+              </a:rPr>
+              <a:t>extensible.”</a:t>
+            </a:r>
+            <a:endParaRPr lang="en-US" dirty="0" smtClean="0">
+              <a:latin typeface="Arial" pitchFamily="34" charset="0"/>
+              <a:cs typeface="Arial" pitchFamily="34" charset="0"/>
+            </a:endParaRPr>
+          </a:p>
+          <a:p>
+            <a:pPr marL="0" indent="0">
+              <a:spcBef>
+                <a:spcPts val="0"/>
+              </a:spcBef>
+              <a:buNone/>
+            </a:pPr>
+            <a:endParaRPr lang="en-US" dirty="0">
+              <a:latin typeface="Arial" pitchFamily="34" charset="0"/>
+              <a:cs typeface="Arial" pitchFamily="34" charset="0"/>
+            </a:endParaRPr>
+          </a:p>
+          <a:p>
+            <a:pPr marL="0" indent="0">
+              <a:spcBef>
+                <a:spcPts val="0"/>
+              </a:spcBef>
+              <a:buNone/>
+            </a:pPr>
+            <a:r>
+              <a:rPr lang="en-US" dirty="0">
+                <a:latin typeface="Arial" pitchFamily="34" charset="0"/>
+                <a:cs typeface="Arial" pitchFamily="34" charset="0"/>
+              </a:rPr>
+              <a:t>“Many users think of R as a statistics system. </a:t>
+            </a:r>
+            <a:r>
+              <a:rPr lang="en-US" dirty="0" smtClean="0">
+                <a:latin typeface="Arial" pitchFamily="34" charset="0"/>
+                <a:cs typeface="Arial" pitchFamily="34" charset="0"/>
+              </a:rPr>
+              <a:t> We </a:t>
+            </a:r>
+            <a:r>
+              <a:rPr lang="en-US" dirty="0">
+                <a:latin typeface="Arial" pitchFamily="34" charset="0"/>
+                <a:cs typeface="Arial" pitchFamily="34" charset="0"/>
+              </a:rPr>
+              <a:t>prefer to think of it of an environment within which statistical techniques are </a:t>
+            </a:r>
+            <a:r>
+              <a:rPr lang="en-US" dirty="0" smtClean="0">
+                <a:latin typeface="Arial" pitchFamily="34" charset="0"/>
+                <a:cs typeface="Arial" pitchFamily="34" charset="0"/>
+              </a:rPr>
+              <a:t>implemented.”</a:t>
+            </a:r>
+          </a:p>
+          <a:p>
+            <a:pPr marL="0" indent="0">
+              <a:spcBef>
+                <a:spcPts val="0"/>
+              </a:spcBef>
+              <a:buNone/>
+            </a:pPr>
+            <a:endParaRPr lang="en-US" dirty="0">
+              <a:latin typeface="Arial" pitchFamily="34" charset="0"/>
+              <a:cs typeface="Arial" pitchFamily="34" charset="0"/>
+            </a:endParaRPr>
+          </a:p>
+          <a:p>
+            <a:pPr marL="0" indent="0">
+              <a:spcBef>
+                <a:spcPts val="0"/>
+              </a:spcBef>
+              <a:buNone/>
+            </a:pPr>
+            <a:r>
+              <a:rPr lang="en-US" dirty="0">
+                <a:latin typeface="Arial" pitchFamily="34" charset="0"/>
+                <a:cs typeface="Arial" pitchFamily="34" charset="0"/>
+                <a:hlinkClick r:id="rId2"/>
+              </a:rPr>
+              <a:t>https://</a:t>
+            </a:r>
+            <a:r>
+              <a:rPr lang="en-US" dirty="0" smtClean="0">
+                <a:latin typeface="Arial" pitchFamily="34" charset="0"/>
+                <a:cs typeface="Arial" pitchFamily="34" charset="0"/>
+                <a:hlinkClick r:id="rId2"/>
+              </a:rPr>
+              <a:t>www.r-project.org/about.html</a:t>
+            </a:r>
+            <a:endParaRPr lang="en-US" dirty="0" smtClean="0">
+              <a:latin typeface="Arial" pitchFamily="34" charset="0"/>
+              <a:cs typeface="Arial" pitchFamily="34" charset="0"/>
+            </a:endParaRPr>
+          </a:p>
+          <a:p>
+            <a:pPr marL="0" indent="0">
+              <a:spcBef>
+                <a:spcPts val="0"/>
+              </a:spcBef>
+              <a:buNone/>
+            </a:pPr>
+            <a:endParaRPr lang="en-US" dirty="0" smtClean="0">
+              <a:latin typeface="Arial" pitchFamily="34" charset="0"/>
+              <a:cs typeface="Arial" pitchFamily="34" charset="0"/>
+            </a:endParaRPr>
           </a:p>
         </p:txBody>
       </p:sp>
-      <p:pic>
-        <p:nvPicPr>
-          <p:cNvPr id="5" name="Picture 4"/>
-          <p:cNvPicPr>
-            <a:picLocks noChangeAspect="1"/>
-          </p:cNvPicPr>
-          <p:nvPr/>
-        </p:nvPicPr>
-        <p:blipFill>
-          <a:blip r:embed="rId2">
-            <a:extLst>
-              <a:ext uri="{28A0092B-C50C-407E-A947-70E740481C1C}">
-                <a14:useLocalDpi xmlns:a14="http://schemas.microsoft.com/office/drawing/2010/main" val="0"/>
-              </a:ext>
-            </a:extLst>
-          </a:blip>
-          <a:stretch>
-            <a:fillRect/>
-          </a:stretch>
-        </p:blipFill>
-        <p:spPr>
-          <a:xfrm>
-            <a:off x="376530" y="1469780"/>
-            <a:ext cx="6980873" cy="3439845"/>
-          </a:xfrm>
-          <a:prstGeom prst="rect">
-            <a:avLst/>
-          </a:prstGeom>
-        </p:spPr>
-      </p:pic>
     </p:spTree>
     <p:extLst>
       <p:ext uri="{BB962C8B-B14F-4D97-AF65-F5344CB8AC3E}">
-        <p14:creationId xmlns:p14="http://schemas.microsoft.com/office/powerpoint/2010/main" val="3895744376"/>
+        <p14:creationId xmlns:p14="http://schemas.microsoft.com/office/powerpoint/2010/main" val="360218663"/>
       </p:ext>
     </p:extLst>
   </p:cSld>
@@ -9064,86 +9684,125 @@
           <a:lstStyle/>
           <a:p>
             <a:r>
+              <a:rPr lang="en-US" sz="3000" dirty="0" smtClean="0">
+                <a:latin typeface="Arial" pitchFamily="34" charset="0"/>
+                <a:cs typeface="Arial" pitchFamily="34" charset="0"/>
+              </a:rPr>
+              <a:t>You got R in my SQL!  No, you got SQL in my R!</a:t>
+            </a:r>
+            <a:endParaRPr lang="en-US" sz="3000" dirty="0">
+              <a:latin typeface="Arial" pitchFamily="34" charset="0"/>
+              <a:cs typeface="Arial" pitchFamily="34" charset="0"/>
+            </a:endParaRPr>
+          </a:p>
+        </p:txBody>
+      </p:sp>
+      <p:sp>
+        <p:nvSpPr>
+          <p:cNvPr id="3" name="Content Placeholder 2"/>
+          <p:cNvSpPr>
+            <a:spLocks noGrp="1"/>
+          </p:cNvSpPr>
+          <p:nvPr>
+            <p:ph idx="1"/>
+          </p:nvPr>
+        </p:nvSpPr>
+        <p:spPr>
+          <a:xfrm>
+            <a:off x="390418" y="1356189"/>
+            <a:ext cx="8640870" cy="4397339"/>
+          </a:xfrm>
+        </p:spPr>
+        <p:txBody>
+          <a:bodyPr/>
+          <a:lstStyle/>
+          <a:p>
+            <a:pPr marL="0" indent="0">
+              <a:spcBef>
+                <a:spcPts val="0"/>
+              </a:spcBef>
+              <a:buNone/>
+            </a:pPr>
+            <a:r>
               <a:rPr lang="en-US" dirty="0" smtClean="0">
                 <a:latin typeface="Arial" pitchFamily="34" charset="0"/>
                 <a:cs typeface="Arial" pitchFamily="34" charset="0"/>
               </a:rPr>
-              <a:t>R</a:t>
-            </a:r>
+              <a:t>Microsoft purchased Revolution Analytics in April 2016.</a:t>
+            </a:r>
+          </a:p>
+          <a:p>
+            <a:pPr marL="0" indent="0">
+              <a:spcBef>
+                <a:spcPts val="0"/>
+              </a:spcBef>
+              <a:buNone/>
+            </a:pPr>
             <a:endParaRPr lang="en-US" dirty="0">
               <a:latin typeface="Arial" pitchFamily="34" charset="0"/>
               <a:cs typeface="Arial" pitchFamily="34" charset="0"/>
             </a:endParaRPr>
           </a:p>
+          <a:p>
+            <a:pPr marL="0" indent="0">
+              <a:spcBef>
+                <a:spcPts val="0"/>
+              </a:spcBef>
+              <a:buNone/>
+            </a:pPr>
+            <a:r>
+              <a:rPr lang="en-US" dirty="0" smtClean="0">
+                <a:latin typeface="Arial" pitchFamily="34" charset="0"/>
+                <a:cs typeface="Arial" pitchFamily="34" charset="0"/>
+              </a:rPr>
+              <a:t>Revolution’s distribution of R will be integrated in SQL Server 2016 under the name of SQL Server R Services.</a:t>
+            </a:r>
+          </a:p>
+          <a:p>
+            <a:pPr marL="0" indent="0">
+              <a:spcBef>
+                <a:spcPts val="0"/>
+              </a:spcBef>
+              <a:buNone/>
+            </a:pPr>
+            <a:endParaRPr lang="en-US" dirty="0">
+              <a:latin typeface="Arial" pitchFamily="34" charset="0"/>
+              <a:cs typeface="Arial" pitchFamily="34" charset="0"/>
+            </a:endParaRPr>
+          </a:p>
+          <a:p>
+            <a:pPr marL="0" indent="0">
+              <a:spcBef>
+                <a:spcPts val="0"/>
+              </a:spcBef>
+              <a:buNone/>
+            </a:pPr>
+            <a:r>
+              <a:rPr lang="en-US" dirty="0" smtClean="0">
+                <a:latin typeface="Arial" pitchFamily="34" charset="0"/>
+                <a:cs typeface="Arial" pitchFamily="34" charset="0"/>
+              </a:rPr>
+              <a:t>First available in CTP 3.0.</a:t>
+            </a:r>
+          </a:p>
+          <a:p>
+            <a:pPr marL="0" indent="0">
+              <a:spcBef>
+                <a:spcPts val="0"/>
+              </a:spcBef>
+              <a:buNone/>
+            </a:pPr>
+            <a:endParaRPr lang="en-US" dirty="0" smtClean="0">
+              <a:latin typeface="Arial" pitchFamily="34" charset="0"/>
+              <a:cs typeface="Arial" pitchFamily="34" charset="0"/>
+            </a:endParaRPr>
+          </a:p>
         </p:txBody>
       </p:sp>
-      <p:sp>
-        <p:nvSpPr>
-          <p:cNvPr id="3" name="Rectangle 2"/>
-          <p:cNvSpPr/>
-          <p:nvPr/>
-        </p:nvSpPr>
-        <p:spPr>
-          <a:xfrm>
-            <a:off x="513708" y="5143473"/>
-            <a:ext cx="1467261" cy="369332"/>
-          </a:xfrm>
-          <a:prstGeom prst="rect">
-            <a:avLst/>
-          </a:prstGeom>
-        </p:spPr>
-        <p:txBody>
-          <a:bodyPr wrap="none">
-            <a:spAutoFit/>
-          </a:bodyPr>
-          <a:lstStyle/>
-          <a:p>
-            <a:r>
-              <a:rPr lang="en-US" dirty="0" smtClean="0"/>
-              <a:t>Source:  </a:t>
-            </a:r>
-            <a:r>
-              <a:rPr lang="en-US" dirty="0" smtClean="0"/>
-              <a:t>TBD</a:t>
-            </a:r>
-            <a:endParaRPr lang="en-US" dirty="0"/>
-          </a:p>
-        </p:txBody>
-      </p:sp>
-      <p:pic>
-        <p:nvPicPr>
-          <p:cNvPr id="5" name="Picture 4"/>
-          <p:cNvPicPr>
-            <a:picLocks noChangeAspect="1"/>
-          </p:cNvPicPr>
-          <p:nvPr/>
-        </p:nvPicPr>
-        <p:blipFill>
-          <a:blip r:embed="rId2">
-            <a:extLst>
-              <a:ext uri="{28A0092B-C50C-407E-A947-70E740481C1C}">
-                <a14:useLocalDpi xmlns:a14="http://schemas.microsoft.com/office/drawing/2010/main" val="0"/>
-              </a:ext>
-            </a:extLst>
-          </a:blip>
-          <a:stretch>
-            <a:fillRect/>
-          </a:stretch>
-        </p:blipFill>
-        <p:spPr>
-          <a:xfrm>
-            <a:off x="412651" y="1450144"/>
-            <a:ext cx="6410179" cy="3248465"/>
-          </a:xfrm>
-          <a:prstGeom prst="rect">
-            <a:avLst/>
-          </a:prstGeom>
-        </p:spPr>
-      </p:pic>
     </p:spTree>
     <p:extLst>
       <p:ext uri="{BB962C8B-B14F-4D97-AF65-F5344CB8AC3E}">
-        <p14:creationId xmlns:p14="http://schemas.microsoft.com/office/powerpoint/2010/main" val="4071654574"/>
+        <p14:creationId xmlns:p14="http://schemas.microsoft.com/office/powerpoint/2010/main" val="1667486938"/>
       </p:ext>
     </p:extLst>
   </p:cSld>
@@ -9202,7 +9861,14 @@
                 <a:latin typeface="Arial" pitchFamily="34" charset="0"/>
                 <a:cs typeface="Arial" pitchFamily="34" charset="0"/>
               </a:rPr>
-              <a:t>Installing SQL Server R Services, part 1</a:t>
+              <a:t>But what can </a:t>
+            </a:r>
+            <a:r>
+              <a:rPr lang="en-US" dirty="0" smtClean="0">
+                <a:latin typeface="Arial" pitchFamily="34" charset="0"/>
+                <a:cs typeface="Arial" pitchFamily="34" charset="0"/>
+              </a:rPr>
+              <a:t>I do with R anyway?</a:t>
             </a:r>
             <a:endParaRPr lang="en-US" dirty="0">
               <a:latin typeface="Arial" pitchFamily="34" charset="0"/>
@@ -9238,67 +9904,12 @@
               <a:buNone/>
             </a:pPr>
             <a:r>
-              <a:rPr lang="en-US" dirty="0">
-                <a:latin typeface="Arial" pitchFamily="34" charset="0"/>
-                <a:cs typeface="Arial" pitchFamily="34" charset="0"/>
-              </a:rPr>
-              <a:t>1</a:t>
-            </a:r>
-            <a:r>
               <a:rPr lang="en-US" dirty="0" smtClean="0">
                 <a:latin typeface="Arial" pitchFamily="34" charset="0"/>
                 <a:cs typeface="Arial" pitchFamily="34" charset="0"/>
               </a:rPr>
-              <a:t>.  Install Advanced Analytics Extensions</a:t>
-            </a:r>
-          </a:p>
-          <a:p>
-            <a:pPr marL="0" indent="0">
-              <a:spcBef>
-                <a:spcPts val="0"/>
-              </a:spcBef>
-              <a:buNone/>
-            </a:pPr>
-            <a:endParaRPr lang="en-US" dirty="0">
-              <a:latin typeface="Arial" pitchFamily="34" charset="0"/>
-              <a:cs typeface="Arial" pitchFamily="34" charset="0"/>
-            </a:endParaRPr>
-          </a:p>
-          <a:p>
-            <a:pPr marL="0" indent="0">
-              <a:spcBef>
-                <a:spcPts val="0"/>
-              </a:spcBef>
-              <a:buNone/>
-            </a:pPr>
-            <a:r>
-              <a:rPr lang="en-US" dirty="0" smtClean="0">
-                <a:latin typeface="Arial" pitchFamily="34" charset="0"/>
-                <a:cs typeface="Arial" pitchFamily="34" charset="0"/>
-                <a:hlinkClick r:id="rId2"/>
-              </a:rPr>
-              <a:t>https</a:t>
-            </a:r>
-            <a:r>
-              <a:rPr lang="en-US" dirty="0">
-                <a:latin typeface="Arial" pitchFamily="34" charset="0"/>
-                <a:cs typeface="Arial" pitchFamily="34" charset="0"/>
-                <a:hlinkClick r:id="rId2"/>
-              </a:rPr>
-              <a:t>://</a:t>
-            </a:r>
-            <a:r>
-              <a:rPr lang="en-US" dirty="0" smtClean="0">
-                <a:latin typeface="Arial" pitchFamily="34" charset="0"/>
-                <a:cs typeface="Arial" pitchFamily="34" charset="0"/>
-                <a:hlinkClick r:id="rId2"/>
-              </a:rPr>
-              <a:t>msdn.microsoft.com/en-US/library/mt590808.aspx</a:t>
-            </a:r>
-            <a:endParaRPr lang="en-US" dirty="0">
-              <a:latin typeface="Arial" pitchFamily="34" charset="0"/>
-              <a:cs typeface="Arial" pitchFamily="34" charset="0"/>
-            </a:endParaRPr>
+              <a:t>Demo #1:  Predicting free disk space</a:t>
+            </a:r>
           </a:p>
           <a:p>
             <a:pPr marL="0" indent="0">
@@ -9317,7 +9928,7 @@
     </p:spTree>
     <p:extLst>
       <p:ext uri="{BB962C8B-B14F-4D97-AF65-F5344CB8AC3E}">
-        <p14:creationId xmlns:p14="http://schemas.microsoft.com/office/powerpoint/2010/main" val="1660605471"/>
+        <p14:creationId xmlns:p14="http://schemas.microsoft.com/office/powerpoint/2010/main" val="4021370742"/>
       </p:ext>
     </p:extLst>
   </p:cSld>
@@ -9376,7 +9987,7 @@
                 <a:latin typeface="Arial" pitchFamily="34" charset="0"/>
                 <a:cs typeface="Arial" pitchFamily="34" charset="0"/>
               </a:rPr>
-              <a:t>Installing SQL Server R Services, part 2</a:t>
+              <a:t>R</a:t>
             </a:r>
             <a:endParaRPr lang="en-US" dirty="0">
               <a:latin typeface="Arial" pitchFamily="34" charset="0"/>
@@ -9385,9 +9996,38 @@
           </a:p>
         </p:txBody>
       </p:sp>
+      <p:sp>
+        <p:nvSpPr>
+          <p:cNvPr id="3" name="Rectangle 2"/>
+          <p:cNvSpPr/>
+          <p:nvPr/>
+        </p:nvSpPr>
+        <p:spPr>
+          <a:xfrm>
+            <a:off x="513708" y="5143473"/>
+            <a:ext cx="1467261" cy="369332"/>
+          </a:xfrm>
+          <a:prstGeom prst="rect">
+            <a:avLst/>
+          </a:prstGeom>
+        </p:spPr>
+        <p:txBody>
+          <a:bodyPr wrap="none">
+            <a:spAutoFit/>
+          </a:bodyPr>
+          <a:lstStyle/>
+          <a:p>
+            <a:r>
+              <a:rPr lang="en-US" dirty="0" smtClean="0"/>
+              <a:t>Source:  TBD</a:t>
+            </a:r>
+            <a:endParaRPr lang="en-US" dirty="0"/>
+          </a:p>
+        </p:txBody>
+      </p:sp>
       <p:pic>
         <p:nvPicPr>
-          <p:cNvPr id="5" name="Picture 4"/>
+          <p:cNvPr id="4" name="Picture 3"/>
           <p:cNvPicPr>
             <a:picLocks noChangeAspect="1"/>
           </p:cNvPicPr>
@@ -9407,8 +10047,8 @@
         </p:blipFill>
         <p:spPr>
           <a:xfrm>
-            <a:off x="253218" y="1336431"/>
-            <a:ext cx="6935373" cy="4174947"/>
+            <a:off x="295422" y="1320166"/>
+            <a:ext cx="5120640" cy="3446585"/>
           </a:xfrm>
           <a:prstGeom prst="rect">
             <a:avLst/>
@@ -9418,7 +10058,7 @@
     </p:spTree>
     <p:extLst>
       <p:ext uri="{BB962C8B-B14F-4D97-AF65-F5344CB8AC3E}">
-        <p14:creationId xmlns:p14="http://schemas.microsoft.com/office/powerpoint/2010/main" val="240537631"/>
+        <p14:creationId xmlns:p14="http://schemas.microsoft.com/office/powerpoint/2010/main" val="317188337"/>
       </p:ext>
     </p:extLst>
   </p:cSld>
@@ -9477,21 +10117,47 @@
                 <a:latin typeface="Arial" pitchFamily="34" charset="0"/>
                 <a:cs typeface="Arial" pitchFamily="34" charset="0"/>
               </a:rPr>
-              <a:t>Installing SQL Server R Services, part </a:t>
-            </a:r>
-            <a:r>
-              <a:rPr lang="en-US" dirty="0">
-                <a:latin typeface="Arial" pitchFamily="34" charset="0"/>
-                <a:cs typeface="Arial" pitchFamily="34" charset="0"/>
-              </a:rPr>
-              <a:t>3</a:t>
-            </a:r>
+              <a:t>R</a:t>
+            </a:r>
+            <a:endParaRPr lang="en-US" dirty="0">
+              <a:latin typeface="Arial" pitchFamily="34" charset="0"/>
+              <a:cs typeface="Arial" pitchFamily="34" charset="0"/>
+            </a:endParaRPr>
+          </a:p>
+        </p:txBody>
+      </p:sp>
+      <p:sp>
+        <p:nvSpPr>
+          <p:cNvPr id="3" name="Rectangle 2"/>
+          <p:cNvSpPr/>
+          <p:nvPr/>
+        </p:nvSpPr>
+        <p:spPr>
+          <a:xfrm>
+            <a:off x="513708" y="5143473"/>
+            <a:ext cx="1467261" cy="369332"/>
+          </a:xfrm>
+          <a:prstGeom prst="rect">
+            <a:avLst/>
+          </a:prstGeom>
+        </p:spPr>
+        <p:txBody>
+          <a:bodyPr wrap="none">
+            <a:spAutoFit/>
+          </a:bodyPr>
+          <a:lstStyle/>
+          <a:p>
+            <a:r>
+              <a:rPr lang="en-US" dirty="0" smtClean="0"/>
+              <a:t>Source:  TBD</a:t>
+            </a:r>
+            <a:endParaRPr lang="en-US" dirty="0"/>
           </a:p>
         </p:txBody>
       </p:sp>
       <p:pic>
         <p:nvPicPr>
-          <p:cNvPr id="3" name="Picture 2"/>
+          <p:cNvPr id="5" name="Picture 4"/>
           <p:cNvPicPr>
             <a:picLocks noChangeAspect="1"/>
           </p:cNvPicPr>
@@ -9511,8 +10177,8 @@
         </p:blipFill>
         <p:spPr>
           <a:xfrm>
-            <a:off x="243179" y="1323584"/>
-            <a:ext cx="5098631" cy="4134681"/>
+            <a:off x="376530" y="1469780"/>
+            <a:ext cx="6980873" cy="3439845"/>
           </a:xfrm>
           <a:prstGeom prst="rect">
             <a:avLst/>
@@ -9522,7 +10188,7 @@
     </p:spTree>
     <p:extLst>
       <p:ext uri="{BB962C8B-B14F-4D97-AF65-F5344CB8AC3E}">
-        <p14:creationId xmlns:p14="http://schemas.microsoft.com/office/powerpoint/2010/main" val="3687509454"/>
+        <p14:creationId xmlns:p14="http://schemas.microsoft.com/office/powerpoint/2010/main" val="3895744376"/>
       </p:ext>
     </p:extLst>
   </p:cSld>
@@ -9581,7 +10247,7 @@
                 <a:latin typeface="Arial" pitchFamily="34" charset="0"/>
                 <a:cs typeface="Arial" pitchFamily="34" charset="0"/>
               </a:rPr>
-              <a:t>Installing SQL Server R Services, part 4</a:t>
+              <a:t>Exponential Growth of R Packages</a:t>
             </a:r>
             <a:endParaRPr lang="en-US" dirty="0">
               <a:latin typeface="Arial" pitchFamily="34" charset="0"/>
@@ -9590,9 +10256,38 @@
           </a:p>
         </p:txBody>
       </p:sp>
+      <p:sp>
+        <p:nvSpPr>
+          <p:cNvPr id="3" name="Rectangle 2"/>
+          <p:cNvSpPr/>
+          <p:nvPr/>
+        </p:nvSpPr>
+        <p:spPr>
+          <a:xfrm>
+            <a:off x="513708" y="5143473"/>
+            <a:ext cx="1467261" cy="369332"/>
+          </a:xfrm>
+          <a:prstGeom prst="rect">
+            <a:avLst/>
+          </a:prstGeom>
+        </p:spPr>
+        <p:txBody>
+          <a:bodyPr wrap="none">
+            <a:spAutoFit/>
+          </a:bodyPr>
+          <a:lstStyle/>
+          <a:p>
+            <a:r>
+              <a:rPr lang="en-US" dirty="0" smtClean="0"/>
+              <a:t>Source:  TBD</a:t>
+            </a:r>
+            <a:endParaRPr lang="en-US" dirty="0"/>
+          </a:p>
+        </p:txBody>
+      </p:sp>
       <p:pic>
         <p:nvPicPr>
-          <p:cNvPr id="4" name="Picture 3"/>
+          <p:cNvPr id="5" name="Picture 4"/>
           <p:cNvPicPr>
             <a:picLocks noChangeAspect="1"/>
           </p:cNvPicPr>
@@ -9612,8 +10307,8 @@
         </p:blipFill>
         <p:spPr>
           <a:xfrm>
-            <a:off x="211016" y="1364383"/>
-            <a:ext cx="6527410" cy="4152699"/>
+            <a:off x="412651" y="1450144"/>
+            <a:ext cx="6410179" cy="3248465"/>
           </a:xfrm>
           <a:prstGeom prst="rect">
             <a:avLst/>
@@ -9623,7 +10318,7 @@
     </p:spTree>
     <p:extLst>
       <p:ext uri="{BB962C8B-B14F-4D97-AF65-F5344CB8AC3E}">
-        <p14:creationId xmlns:p14="http://schemas.microsoft.com/office/powerpoint/2010/main" val="2571625966"/>
+        <p14:creationId xmlns:p14="http://schemas.microsoft.com/office/powerpoint/2010/main" val="4071654574"/>
       </p:ext>
     </p:extLst>
   </p:cSld>

</xml_diff>